<commit_message>
add nn_maxpool.py and update maxpool chapter in PPT
</commit_message>
<xml_diff>
--- a/notes/演示.pptx
+++ b/notes/演示.pptx
@@ -10,6 +10,7 @@
     <p:sldId id="258" r:id="rId4"/>
     <p:sldId id="259" r:id="rId5"/>
     <p:sldId id="260" r:id="rId6"/>
+    <p:sldId id="261" r:id="rId7"/>
   </p:sldIdLst>
   <p:sldSz cx="12192000" cy="6858000"/>
   <p:notesSz cx="6858000" cy="9144000"/>
@@ -263,7 +264,7 @@
           <a:p>
             <a:fld id="{1B839DDA-FDEA-D74D-B0E8-579EAEAB0023}" type="datetimeFigureOut">
               <a:rPr kumimoji="1" lang="zh-CN" altLang="en-US" smtClean="0"/>
-              <a:t>2021/5/15</a:t>
+              <a:t>2021/5/22</a:t>
             </a:fld>
             <a:endParaRPr kumimoji="1" lang="zh-CN" altLang="en-US"/>
           </a:p>
@@ -461,7 +462,7 @@
           <a:p>
             <a:fld id="{1B839DDA-FDEA-D74D-B0E8-579EAEAB0023}" type="datetimeFigureOut">
               <a:rPr kumimoji="1" lang="zh-CN" altLang="en-US" smtClean="0"/>
-              <a:t>2021/5/15</a:t>
+              <a:t>2021/5/22</a:t>
             </a:fld>
             <a:endParaRPr kumimoji="1" lang="zh-CN" altLang="en-US"/>
           </a:p>
@@ -669,7 +670,7 @@
           <a:p>
             <a:fld id="{1B839DDA-FDEA-D74D-B0E8-579EAEAB0023}" type="datetimeFigureOut">
               <a:rPr kumimoji="1" lang="zh-CN" altLang="en-US" smtClean="0"/>
-              <a:t>2021/5/15</a:t>
+              <a:t>2021/5/22</a:t>
             </a:fld>
             <a:endParaRPr kumimoji="1" lang="zh-CN" altLang="en-US"/>
           </a:p>
@@ -867,7 +868,7 @@
           <a:p>
             <a:fld id="{1B839DDA-FDEA-D74D-B0E8-579EAEAB0023}" type="datetimeFigureOut">
               <a:rPr kumimoji="1" lang="zh-CN" altLang="en-US" smtClean="0"/>
-              <a:t>2021/5/15</a:t>
+              <a:t>2021/5/22</a:t>
             </a:fld>
             <a:endParaRPr kumimoji="1" lang="zh-CN" altLang="en-US"/>
           </a:p>
@@ -1142,7 +1143,7 @@
           <a:p>
             <a:fld id="{1B839DDA-FDEA-D74D-B0E8-579EAEAB0023}" type="datetimeFigureOut">
               <a:rPr kumimoji="1" lang="zh-CN" altLang="en-US" smtClean="0"/>
-              <a:t>2021/5/15</a:t>
+              <a:t>2021/5/22</a:t>
             </a:fld>
             <a:endParaRPr kumimoji="1" lang="zh-CN" altLang="en-US"/>
           </a:p>
@@ -1407,7 +1408,7 @@
           <a:p>
             <a:fld id="{1B839DDA-FDEA-D74D-B0E8-579EAEAB0023}" type="datetimeFigureOut">
               <a:rPr kumimoji="1" lang="zh-CN" altLang="en-US" smtClean="0"/>
-              <a:t>2021/5/15</a:t>
+              <a:t>2021/5/22</a:t>
             </a:fld>
             <a:endParaRPr kumimoji="1" lang="zh-CN" altLang="en-US"/>
           </a:p>
@@ -1819,7 +1820,7 @@
           <a:p>
             <a:fld id="{1B839DDA-FDEA-D74D-B0E8-579EAEAB0023}" type="datetimeFigureOut">
               <a:rPr kumimoji="1" lang="zh-CN" altLang="en-US" smtClean="0"/>
-              <a:t>2021/5/15</a:t>
+              <a:t>2021/5/22</a:t>
             </a:fld>
             <a:endParaRPr kumimoji="1" lang="zh-CN" altLang="en-US"/>
           </a:p>
@@ -1960,7 +1961,7 @@
           <a:p>
             <a:fld id="{1B839DDA-FDEA-D74D-B0E8-579EAEAB0023}" type="datetimeFigureOut">
               <a:rPr kumimoji="1" lang="zh-CN" altLang="en-US" smtClean="0"/>
-              <a:t>2021/5/15</a:t>
+              <a:t>2021/5/22</a:t>
             </a:fld>
             <a:endParaRPr kumimoji="1" lang="zh-CN" altLang="en-US"/>
           </a:p>
@@ -2073,7 +2074,7 @@
           <a:p>
             <a:fld id="{1B839DDA-FDEA-D74D-B0E8-579EAEAB0023}" type="datetimeFigureOut">
               <a:rPr kumimoji="1" lang="zh-CN" altLang="en-US" smtClean="0"/>
-              <a:t>2021/5/15</a:t>
+              <a:t>2021/5/22</a:t>
             </a:fld>
             <a:endParaRPr kumimoji="1" lang="zh-CN" altLang="en-US"/>
           </a:p>
@@ -2384,7 +2385,7 @@
           <a:p>
             <a:fld id="{1B839DDA-FDEA-D74D-B0E8-579EAEAB0023}" type="datetimeFigureOut">
               <a:rPr kumimoji="1" lang="zh-CN" altLang="en-US" smtClean="0"/>
-              <a:t>2021/5/15</a:t>
+              <a:t>2021/5/22</a:t>
             </a:fld>
             <a:endParaRPr kumimoji="1" lang="zh-CN" altLang="en-US"/>
           </a:p>
@@ -2672,7 +2673,7 @@
           <a:p>
             <a:fld id="{1B839DDA-FDEA-D74D-B0E8-579EAEAB0023}" type="datetimeFigureOut">
               <a:rPr kumimoji="1" lang="zh-CN" altLang="en-US" smtClean="0"/>
-              <a:t>2021/5/15</a:t>
+              <a:t>2021/5/22</a:t>
             </a:fld>
             <a:endParaRPr kumimoji="1" lang="zh-CN" altLang="en-US"/>
           </a:p>
@@ -2913,7 +2914,7 @@
           <a:p>
             <a:fld id="{1B839DDA-FDEA-D74D-B0E8-579EAEAB0023}" type="datetimeFigureOut">
               <a:rPr kumimoji="1" lang="zh-CN" altLang="en-US" smtClean="0"/>
-              <a:t>2021/5/15</a:t>
+              <a:t>2021/5/22</a:t>
             </a:fld>
             <a:endParaRPr kumimoji="1" lang="zh-CN" altLang="en-US"/>
           </a:p>
@@ -7274,6 +7275,41 @@
           </a:p>
         </p:txBody>
       </p:sp>
+      <p:sp>
+        <p:nvSpPr>
+          <p:cNvPr id="3" name="文本框 2">
+            <a:extLst>
+              <a:ext uri="{FF2B5EF4-FFF2-40B4-BE49-F238E27FC236}">
+                <a16:creationId xmlns:a16="http://schemas.microsoft.com/office/drawing/2014/main" id="{594908C8-BBE9-DF4A-BC51-EA6F94CB79B7}"/>
+              </a:ext>
+            </a:extLst>
+          </p:cNvPr>
+          <p:cNvSpPr txBox="1"/>
+          <p:nvPr/>
+        </p:nvSpPr>
+        <p:spPr>
+          <a:xfrm>
+            <a:off x="4767309" y="213064"/>
+            <a:ext cx="3157491" cy="369332"/>
+          </a:xfrm>
+          <a:prstGeom prst="rect">
+            <a:avLst/>
+          </a:prstGeom>
+          <a:noFill/>
+        </p:spPr>
+        <p:txBody>
+          <a:bodyPr wrap="square" rtlCol="0">
+            <a:spAutoFit/>
+          </a:bodyPr>
+          <a:lstStyle/>
+          <a:p>
+            <a:r>
+              <a:rPr kumimoji="1" lang="zh-CN" altLang="en-US" dirty="0"/>
+              <a:t>卷积操作</a:t>
+            </a:r>
+          </a:p>
+        </p:txBody>
+      </p:sp>
     </p:spTree>
     <p:extLst>
       <p:ext uri="{BB962C8B-B14F-4D97-AF65-F5344CB8AC3E}">
@@ -15537,6 +15573,2803 @@
     <p:extLst>
       <p:ext uri="{BB962C8B-B14F-4D97-AF65-F5344CB8AC3E}">
         <p14:creationId xmlns:p14="http://schemas.microsoft.com/office/powerpoint/2010/main" val="3452007687"/>
+      </p:ext>
+    </p:extLst>
+  </p:cSld>
+  <p:clrMapOvr>
+    <a:masterClrMapping/>
+  </p:clrMapOvr>
+</p:sld>
+</file>
+
+<file path=ppt/slides/slide6.xml><?xml version="1.0" encoding="utf-8"?>
+<p:sld xmlns:a="http://schemas.openxmlformats.org/drawingml/2006/main" xmlns:r="http://schemas.openxmlformats.org/officeDocument/2006/relationships" xmlns:p="http://schemas.openxmlformats.org/presentationml/2006/main">
+  <p:cSld>
+    <p:spTree>
+      <p:nvGrpSpPr>
+        <p:cNvPr id="1" name=""/>
+        <p:cNvGrpSpPr/>
+        <p:nvPr/>
+      </p:nvGrpSpPr>
+      <p:grpSpPr>
+        <a:xfrm>
+          <a:off x="0" y="0"/>
+          <a:ext cx="0" cy="0"/>
+          <a:chOff x="0" y="0"/>
+          <a:chExt cx="0" cy="0"/>
+        </a:xfrm>
+      </p:grpSpPr>
+      <p:graphicFrame>
+        <p:nvGraphicFramePr>
+          <p:cNvPr id="2" name="表格 1">
+            <a:extLst>
+              <a:ext uri="{FF2B5EF4-FFF2-40B4-BE49-F238E27FC236}">
+                <a16:creationId xmlns:a16="http://schemas.microsoft.com/office/drawing/2014/main" id="{87031707-2D30-E54C-A5FE-0E6003E99A2C}"/>
+              </a:ext>
+            </a:extLst>
+          </p:cNvPr>
+          <p:cNvGraphicFramePr>
+            <a:graphicFrameLocks noGrp="1"/>
+          </p:cNvGraphicFramePr>
+          <p:nvPr/>
+        </p:nvGraphicFramePr>
+        <p:xfrm>
+          <a:off x="479227" y="486886"/>
+          <a:ext cx="2695773" cy="2942114"/>
+        </p:xfrm>
+        <a:graphic>
+          <a:graphicData uri="http://schemas.openxmlformats.org/drawingml/2006/table">
+            <a:tbl>
+              <a:tblPr/>
+              <a:tblGrid>
+                <a:gridCol w="526518">
+                  <a:extLst>
+                    <a:ext uri="{9D8B030D-6E8A-4147-A177-3AD203B41FA5}">
+                      <a16:colId xmlns:a16="http://schemas.microsoft.com/office/drawing/2014/main" val="2264575779"/>
+                    </a:ext>
+                  </a:extLst>
+                </a:gridCol>
+                <a:gridCol w="547579">
+                  <a:extLst>
+                    <a:ext uri="{9D8B030D-6E8A-4147-A177-3AD203B41FA5}">
+                      <a16:colId xmlns:a16="http://schemas.microsoft.com/office/drawing/2014/main" val="1283912556"/>
+                    </a:ext>
+                  </a:extLst>
+                </a:gridCol>
+                <a:gridCol w="526518">
+                  <a:extLst>
+                    <a:ext uri="{9D8B030D-6E8A-4147-A177-3AD203B41FA5}">
+                      <a16:colId xmlns:a16="http://schemas.microsoft.com/office/drawing/2014/main" val="409442440"/>
+                    </a:ext>
+                  </a:extLst>
+                </a:gridCol>
+                <a:gridCol w="547579">
+                  <a:extLst>
+                    <a:ext uri="{9D8B030D-6E8A-4147-A177-3AD203B41FA5}">
+                      <a16:colId xmlns:a16="http://schemas.microsoft.com/office/drawing/2014/main" val="3207998226"/>
+                    </a:ext>
+                  </a:extLst>
+                </a:gridCol>
+                <a:gridCol w="547579">
+                  <a:extLst>
+                    <a:ext uri="{9D8B030D-6E8A-4147-A177-3AD203B41FA5}">
+                      <a16:colId xmlns:a16="http://schemas.microsoft.com/office/drawing/2014/main" val="3868209946"/>
+                    </a:ext>
+                  </a:extLst>
+                </a:gridCol>
+              </a:tblGrid>
+              <a:tr h="629966">
+                <a:tc>
+                  <a:txBody>
+                    <a:bodyPr/>
+                    <a:lstStyle/>
+                    <a:p>
+                      <a:pPr algn="ctr"/>
+                      <a:r>
+                        <a:rPr lang="en-US" altLang="zh-CN" b="1" dirty="0">
+                          <a:solidFill>
+                            <a:schemeClr val="bg1"/>
+                          </a:solidFill>
+                          <a:effectLst/>
+                          <a:latin typeface="Helvetica" pitchFamily="2" charset="0"/>
+                        </a:rPr>
+                        <a:t>1</a:t>
+                      </a:r>
+                      <a:endParaRPr lang="zh-CN" altLang="en-US" b="1" dirty="0">
+                        <a:solidFill>
+                          <a:schemeClr val="bg1"/>
+                        </a:solidFill>
+                        <a:effectLst/>
+                        <a:latin typeface="Helvetica" pitchFamily="2" charset="0"/>
+                      </a:endParaRPr>
+                    </a:p>
+                  </a:txBody>
+                  <a:tcPr marL="38100" marR="38100" marT="38100" marB="38100" anchor="ctr">
+                    <a:lnL w="9525" cap="flat" cmpd="sng" algn="ctr">
+                      <a:solidFill>
+                        <a:srgbClr val="FFFFFF"/>
+                      </a:solidFill>
+                      <a:prstDash val="solid"/>
+                      <a:round/>
+                      <a:headEnd type="none" w="med" len="med"/>
+                      <a:tailEnd type="none" w="med" len="med"/>
+                    </a:lnL>
+                    <a:lnR w="9525" cap="flat" cmpd="sng" algn="ctr">
+                      <a:solidFill>
+                        <a:srgbClr val="FFFFFF"/>
+                      </a:solidFill>
+                      <a:prstDash val="solid"/>
+                      <a:round/>
+                      <a:headEnd type="none" w="med" len="med"/>
+                      <a:tailEnd type="none" w="med" len="med"/>
+                    </a:lnR>
+                    <a:lnT w="9525" cap="flat" cmpd="sng" algn="ctr">
+                      <a:solidFill>
+                        <a:srgbClr val="FFFFFF"/>
+                      </a:solidFill>
+                      <a:prstDash val="solid"/>
+                      <a:round/>
+                      <a:headEnd type="none" w="med" len="med"/>
+                      <a:tailEnd type="none" w="med" len="med"/>
+                    </a:lnT>
+                    <a:lnB w="9525" cap="flat" cmpd="sng" algn="ctr">
+                      <a:solidFill>
+                        <a:srgbClr val="FFFFFF"/>
+                      </a:solidFill>
+                      <a:prstDash val="solid"/>
+                      <a:round/>
+                      <a:headEnd type="none" w="med" len="med"/>
+                      <a:tailEnd type="none" w="med" len="med"/>
+                    </a:lnB>
+                    <a:solidFill>
+                      <a:srgbClr val="2174C7"/>
+                    </a:solidFill>
+                  </a:tcPr>
+                </a:tc>
+                <a:tc>
+                  <a:txBody>
+                    <a:bodyPr/>
+                    <a:lstStyle/>
+                    <a:p>
+                      <a:pPr algn="ctr"/>
+                      <a:r>
+                        <a:rPr lang="en-US" altLang="zh-CN" b="1" dirty="0">
+                          <a:solidFill>
+                            <a:schemeClr val="bg1"/>
+                          </a:solidFill>
+                          <a:effectLst/>
+                          <a:latin typeface="Helvetica" pitchFamily="2" charset="0"/>
+                        </a:rPr>
+                        <a:t>2</a:t>
+                      </a:r>
+                      <a:endParaRPr lang="zh-CN" altLang="en-US" b="1" dirty="0">
+                        <a:solidFill>
+                          <a:schemeClr val="bg1"/>
+                        </a:solidFill>
+                        <a:effectLst/>
+                        <a:latin typeface="Helvetica" pitchFamily="2" charset="0"/>
+                      </a:endParaRPr>
+                    </a:p>
+                  </a:txBody>
+                  <a:tcPr marL="38100" marR="38100" marT="38100" marB="38100" anchor="ctr">
+                    <a:lnL w="9525" cap="flat" cmpd="sng" algn="ctr">
+                      <a:solidFill>
+                        <a:srgbClr val="FFFFFF"/>
+                      </a:solidFill>
+                      <a:prstDash val="solid"/>
+                      <a:round/>
+                      <a:headEnd type="none" w="med" len="med"/>
+                      <a:tailEnd type="none" w="med" len="med"/>
+                    </a:lnL>
+                    <a:lnR w="9525" cap="flat" cmpd="sng" algn="ctr">
+                      <a:solidFill>
+                        <a:srgbClr val="FFFFFF"/>
+                      </a:solidFill>
+                      <a:prstDash val="solid"/>
+                      <a:round/>
+                      <a:headEnd type="none" w="med" len="med"/>
+                      <a:tailEnd type="none" w="med" len="med"/>
+                    </a:lnR>
+                    <a:lnT w="9525" cap="flat" cmpd="sng" algn="ctr">
+                      <a:solidFill>
+                        <a:srgbClr val="FFFFFF"/>
+                      </a:solidFill>
+                      <a:prstDash val="solid"/>
+                      <a:round/>
+                      <a:headEnd type="none" w="med" len="med"/>
+                      <a:tailEnd type="none" w="med" len="med"/>
+                    </a:lnT>
+                    <a:lnB w="9525" cap="flat" cmpd="sng" algn="ctr">
+                      <a:solidFill>
+                        <a:srgbClr val="FFFFFF"/>
+                      </a:solidFill>
+                      <a:prstDash val="solid"/>
+                      <a:round/>
+                      <a:headEnd type="none" w="med" len="med"/>
+                      <a:tailEnd type="none" w="med" len="med"/>
+                    </a:lnB>
+                    <a:solidFill>
+                      <a:srgbClr val="2174C7"/>
+                    </a:solidFill>
+                  </a:tcPr>
+                </a:tc>
+                <a:tc>
+                  <a:txBody>
+                    <a:bodyPr/>
+                    <a:lstStyle/>
+                    <a:p>
+                      <a:pPr algn="ctr"/>
+                      <a:r>
+                        <a:rPr lang="en-US" altLang="zh-CN" b="1" dirty="0">
+                          <a:solidFill>
+                            <a:schemeClr val="bg1"/>
+                          </a:solidFill>
+                          <a:effectLst/>
+                          <a:latin typeface="Helvetica" pitchFamily="2" charset="0"/>
+                        </a:rPr>
+                        <a:t>0</a:t>
+                      </a:r>
+                      <a:endParaRPr lang="zh-CN" altLang="en-US" b="1" dirty="0">
+                        <a:solidFill>
+                          <a:schemeClr val="bg1"/>
+                        </a:solidFill>
+                        <a:effectLst/>
+                        <a:latin typeface="Helvetica" pitchFamily="2" charset="0"/>
+                      </a:endParaRPr>
+                    </a:p>
+                  </a:txBody>
+                  <a:tcPr marL="38100" marR="38100" marT="38100" marB="38100" anchor="ctr">
+                    <a:lnL w="9525" cap="flat" cmpd="sng" algn="ctr">
+                      <a:solidFill>
+                        <a:srgbClr val="FFFFFF"/>
+                      </a:solidFill>
+                      <a:prstDash val="solid"/>
+                      <a:round/>
+                      <a:headEnd type="none" w="med" len="med"/>
+                      <a:tailEnd type="none" w="med" len="med"/>
+                    </a:lnL>
+                    <a:lnR w="9525" cap="flat" cmpd="sng" algn="ctr">
+                      <a:solidFill>
+                        <a:srgbClr val="FFFFFF"/>
+                      </a:solidFill>
+                      <a:prstDash val="solid"/>
+                      <a:round/>
+                      <a:headEnd type="none" w="med" len="med"/>
+                      <a:tailEnd type="none" w="med" len="med"/>
+                    </a:lnR>
+                    <a:lnT w="9525" cap="flat" cmpd="sng" algn="ctr">
+                      <a:solidFill>
+                        <a:srgbClr val="FFFFFF"/>
+                      </a:solidFill>
+                      <a:prstDash val="solid"/>
+                      <a:round/>
+                      <a:headEnd type="none" w="med" len="med"/>
+                      <a:tailEnd type="none" w="med" len="med"/>
+                    </a:lnT>
+                    <a:lnB w="9525" cap="flat" cmpd="sng" algn="ctr">
+                      <a:solidFill>
+                        <a:srgbClr val="FFFFFF"/>
+                      </a:solidFill>
+                      <a:prstDash val="solid"/>
+                      <a:round/>
+                      <a:headEnd type="none" w="med" len="med"/>
+                      <a:tailEnd type="none" w="med" len="med"/>
+                    </a:lnB>
+                    <a:solidFill>
+                      <a:srgbClr val="2174C7"/>
+                    </a:solidFill>
+                  </a:tcPr>
+                </a:tc>
+                <a:tc>
+                  <a:txBody>
+                    <a:bodyPr/>
+                    <a:lstStyle/>
+                    <a:p>
+                      <a:pPr algn="ctr"/>
+                      <a:r>
+                        <a:rPr lang="en-US" altLang="zh-CN" b="1" dirty="0">
+                          <a:solidFill>
+                            <a:schemeClr val="bg1"/>
+                          </a:solidFill>
+                          <a:effectLst/>
+                          <a:latin typeface="Helvetica" pitchFamily="2" charset="0"/>
+                        </a:rPr>
+                        <a:t>3</a:t>
+                      </a:r>
+                      <a:endParaRPr lang="zh-CN" altLang="en-US" b="1" dirty="0">
+                        <a:solidFill>
+                          <a:schemeClr val="bg1"/>
+                        </a:solidFill>
+                        <a:effectLst/>
+                        <a:latin typeface="Helvetica" pitchFamily="2" charset="0"/>
+                      </a:endParaRPr>
+                    </a:p>
+                  </a:txBody>
+                  <a:tcPr marL="38100" marR="38100" marT="38100" marB="38100" anchor="ctr">
+                    <a:lnL w="9525" cap="flat" cmpd="sng" algn="ctr">
+                      <a:solidFill>
+                        <a:srgbClr val="FFFFFF"/>
+                      </a:solidFill>
+                      <a:prstDash val="solid"/>
+                      <a:round/>
+                      <a:headEnd type="none" w="med" len="med"/>
+                      <a:tailEnd type="none" w="med" len="med"/>
+                    </a:lnL>
+                    <a:lnR w="9525" cap="flat" cmpd="sng" algn="ctr">
+                      <a:solidFill>
+                        <a:srgbClr val="FFFFFF"/>
+                      </a:solidFill>
+                      <a:prstDash val="solid"/>
+                      <a:round/>
+                      <a:headEnd type="none" w="med" len="med"/>
+                      <a:tailEnd type="none" w="med" len="med"/>
+                    </a:lnR>
+                    <a:lnT w="9525" cap="flat" cmpd="sng" algn="ctr">
+                      <a:solidFill>
+                        <a:srgbClr val="FFFFFF"/>
+                      </a:solidFill>
+                      <a:prstDash val="solid"/>
+                      <a:round/>
+                      <a:headEnd type="none" w="med" len="med"/>
+                      <a:tailEnd type="none" w="med" len="med"/>
+                    </a:lnT>
+                    <a:lnB w="9525" cap="flat" cmpd="sng" algn="ctr">
+                      <a:solidFill>
+                        <a:srgbClr val="FFFFFF"/>
+                      </a:solidFill>
+                      <a:prstDash val="solid"/>
+                      <a:round/>
+                      <a:headEnd type="none" w="med" len="med"/>
+                      <a:tailEnd type="none" w="med" len="med"/>
+                    </a:lnB>
+                    <a:solidFill>
+                      <a:srgbClr val="2174C7"/>
+                    </a:solidFill>
+                  </a:tcPr>
+                </a:tc>
+                <a:tc>
+                  <a:txBody>
+                    <a:bodyPr/>
+                    <a:lstStyle/>
+                    <a:p>
+                      <a:pPr algn="ctr"/>
+                      <a:r>
+                        <a:rPr lang="en-US" altLang="zh-CN" b="1" dirty="0">
+                          <a:solidFill>
+                            <a:schemeClr val="bg1"/>
+                          </a:solidFill>
+                          <a:effectLst/>
+                          <a:latin typeface="Helvetica" pitchFamily="2" charset="0"/>
+                        </a:rPr>
+                        <a:t>1</a:t>
+                      </a:r>
+                      <a:endParaRPr lang="zh-CN" altLang="en-US" b="1" dirty="0">
+                        <a:solidFill>
+                          <a:schemeClr val="bg1"/>
+                        </a:solidFill>
+                        <a:effectLst/>
+                        <a:latin typeface="Helvetica" pitchFamily="2" charset="0"/>
+                      </a:endParaRPr>
+                    </a:p>
+                  </a:txBody>
+                  <a:tcPr marL="38100" marR="38100" marT="38100" marB="38100" anchor="ctr">
+                    <a:lnL w="9525" cap="flat" cmpd="sng" algn="ctr">
+                      <a:solidFill>
+                        <a:srgbClr val="FFFFFF"/>
+                      </a:solidFill>
+                      <a:prstDash val="solid"/>
+                      <a:round/>
+                      <a:headEnd type="none" w="med" len="med"/>
+                      <a:tailEnd type="none" w="med" len="med"/>
+                    </a:lnL>
+                    <a:lnR w="9525" cap="flat" cmpd="sng" algn="ctr">
+                      <a:solidFill>
+                        <a:srgbClr val="FFFFFF"/>
+                      </a:solidFill>
+                      <a:prstDash val="solid"/>
+                      <a:round/>
+                      <a:headEnd type="none" w="med" len="med"/>
+                      <a:tailEnd type="none" w="med" len="med"/>
+                    </a:lnR>
+                    <a:lnT w="9525" cap="flat" cmpd="sng" algn="ctr">
+                      <a:solidFill>
+                        <a:srgbClr val="FFFFFF"/>
+                      </a:solidFill>
+                      <a:prstDash val="solid"/>
+                      <a:round/>
+                      <a:headEnd type="none" w="med" len="med"/>
+                      <a:tailEnd type="none" w="med" len="med"/>
+                    </a:lnT>
+                    <a:lnB w="9525" cap="flat" cmpd="sng" algn="ctr">
+                      <a:solidFill>
+                        <a:srgbClr val="FFFFFF"/>
+                      </a:solidFill>
+                      <a:prstDash val="solid"/>
+                      <a:round/>
+                      <a:headEnd type="none" w="med" len="med"/>
+                      <a:tailEnd type="none" w="med" len="med"/>
+                    </a:lnB>
+                    <a:solidFill>
+                      <a:srgbClr val="2174C7"/>
+                    </a:solidFill>
+                  </a:tcPr>
+                </a:tc>
+                <a:extLst>
+                  <a:ext uri="{0D108BD9-81ED-4DB2-BD59-A6C34878D82A}">
+                    <a16:rowId xmlns:a16="http://schemas.microsoft.com/office/drawing/2014/main" val="1765986271"/>
+                  </a:ext>
+                </a:extLst>
+              </a:tr>
+              <a:tr h="578037">
+                <a:tc>
+                  <a:txBody>
+                    <a:bodyPr/>
+                    <a:lstStyle/>
+                    <a:p>
+                      <a:pPr algn="ctr"/>
+                      <a:r>
+                        <a:rPr lang="en-US" altLang="zh-CN" b="1" dirty="0">
+                          <a:solidFill>
+                            <a:schemeClr val="bg1"/>
+                          </a:solidFill>
+                          <a:effectLst/>
+                          <a:latin typeface="Helvetica" pitchFamily="2" charset="0"/>
+                        </a:rPr>
+                        <a:t>0</a:t>
+                      </a:r>
+                      <a:endParaRPr lang="zh-CN" altLang="en-US" b="1" dirty="0">
+                        <a:solidFill>
+                          <a:schemeClr val="bg1"/>
+                        </a:solidFill>
+                        <a:effectLst/>
+                        <a:latin typeface="Helvetica" pitchFamily="2" charset="0"/>
+                      </a:endParaRPr>
+                    </a:p>
+                  </a:txBody>
+                  <a:tcPr marL="38100" marR="38100" marT="38100" marB="38100" anchor="ctr">
+                    <a:lnL w="9525" cap="flat" cmpd="sng" algn="ctr">
+                      <a:solidFill>
+                        <a:srgbClr val="FFFFFF"/>
+                      </a:solidFill>
+                      <a:prstDash val="solid"/>
+                      <a:round/>
+                      <a:headEnd type="none" w="med" len="med"/>
+                      <a:tailEnd type="none" w="med" len="med"/>
+                    </a:lnL>
+                    <a:lnR w="9525" cap="flat" cmpd="sng" algn="ctr">
+                      <a:solidFill>
+                        <a:srgbClr val="FFFFFF"/>
+                      </a:solidFill>
+                      <a:prstDash val="solid"/>
+                      <a:round/>
+                      <a:headEnd type="none" w="med" len="med"/>
+                      <a:tailEnd type="none" w="med" len="med"/>
+                    </a:lnR>
+                    <a:lnT w="9525" cap="flat" cmpd="sng" algn="ctr">
+                      <a:solidFill>
+                        <a:srgbClr val="FFFFFF"/>
+                      </a:solidFill>
+                      <a:prstDash val="solid"/>
+                      <a:round/>
+                      <a:headEnd type="none" w="med" len="med"/>
+                      <a:tailEnd type="none" w="med" len="med"/>
+                    </a:lnT>
+                    <a:lnB w="9525" cap="flat" cmpd="sng" algn="ctr">
+                      <a:solidFill>
+                        <a:srgbClr val="FFFFFF"/>
+                      </a:solidFill>
+                      <a:prstDash val="solid"/>
+                      <a:round/>
+                      <a:headEnd type="none" w="med" len="med"/>
+                      <a:tailEnd type="none" w="med" len="med"/>
+                    </a:lnB>
+                    <a:solidFill>
+                      <a:srgbClr val="2174C7"/>
+                    </a:solidFill>
+                  </a:tcPr>
+                </a:tc>
+                <a:tc>
+                  <a:txBody>
+                    <a:bodyPr/>
+                    <a:lstStyle/>
+                    <a:p>
+                      <a:pPr algn="ctr"/>
+                      <a:r>
+                        <a:rPr lang="en-US" altLang="zh-CN" b="1" dirty="0">
+                          <a:solidFill>
+                            <a:schemeClr val="bg1"/>
+                          </a:solidFill>
+                          <a:effectLst/>
+                          <a:latin typeface="Helvetica" pitchFamily="2" charset="0"/>
+                        </a:rPr>
+                        <a:t>1</a:t>
+                      </a:r>
+                      <a:endParaRPr lang="zh-CN" altLang="en-US" b="1" dirty="0">
+                        <a:solidFill>
+                          <a:schemeClr val="bg1"/>
+                        </a:solidFill>
+                        <a:effectLst/>
+                        <a:latin typeface="Helvetica" pitchFamily="2" charset="0"/>
+                      </a:endParaRPr>
+                    </a:p>
+                  </a:txBody>
+                  <a:tcPr marL="38100" marR="38100" marT="38100" marB="38100" anchor="ctr">
+                    <a:lnL w="9525" cap="flat" cmpd="sng" algn="ctr">
+                      <a:solidFill>
+                        <a:srgbClr val="FFFFFF"/>
+                      </a:solidFill>
+                      <a:prstDash val="solid"/>
+                      <a:round/>
+                      <a:headEnd type="none" w="med" len="med"/>
+                      <a:tailEnd type="none" w="med" len="med"/>
+                    </a:lnL>
+                    <a:lnR w="9525" cap="flat" cmpd="sng" algn="ctr">
+                      <a:solidFill>
+                        <a:srgbClr val="FFFFFF"/>
+                      </a:solidFill>
+                      <a:prstDash val="solid"/>
+                      <a:round/>
+                      <a:headEnd type="none" w="med" len="med"/>
+                      <a:tailEnd type="none" w="med" len="med"/>
+                    </a:lnR>
+                    <a:lnT w="9525" cap="flat" cmpd="sng" algn="ctr">
+                      <a:solidFill>
+                        <a:srgbClr val="FFFFFF"/>
+                      </a:solidFill>
+                      <a:prstDash val="solid"/>
+                      <a:round/>
+                      <a:headEnd type="none" w="med" len="med"/>
+                      <a:tailEnd type="none" w="med" len="med"/>
+                    </a:lnT>
+                    <a:lnB w="9525" cap="flat" cmpd="sng" algn="ctr">
+                      <a:solidFill>
+                        <a:srgbClr val="FFFFFF"/>
+                      </a:solidFill>
+                      <a:prstDash val="solid"/>
+                      <a:round/>
+                      <a:headEnd type="none" w="med" len="med"/>
+                      <a:tailEnd type="none" w="med" len="med"/>
+                    </a:lnB>
+                    <a:solidFill>
+                      <a:srgbClr val="2174C7"/>
+                    </a:solidFill>
+                  </a:tcPr>
+                </a:tc>
+                <a:tc>
+                  <a:txBody>
+                    <a:bodyPr/>
+                    <a:lstStyle/>
+                    <a:p>
+                      <a:pPr algn="ctr"/>
+                      <a:r>
+                        <a:rPr lang="en-US" altLang="zh-CN" b="1" dirty="0">
+                          <a:solidFill>
+                            <a:schemeClr val="bg1"/>
+                          </a:solidFill>
+                          <a:effectLst/>
+                          <a:latin typeface="Helvetica" pitchFamily="2" charset="0"/>
+                        </a:rPr>
+                        <a:t>2</a:t>
+                      </a:r>
+                      <a:endParaRPr lang="zh-CN" altLang="en-US" b="1" dirty="0">
+                        <a:solidFill>
+                          <a:schemeClr val="bg1"/>
+                        </a:solidFill>
+                        <a:effectLst/>
+                        <a:latin typeface="Helvetica" pitchFamily="2" charset="0"/>
+                      </a:endParaRPr>
+                    </a:p>
+                  </a:txBody>
+                  <a:tcPr marL="38100" marR="38100" marT="38100" marB="38100" anchor="ctr">
+                    <a:lnL w="9525" cap="flat" cmpd="sng" algn="ctr">
+                      <a:solidFill>
+                        <a:srgbClr val="FFFFFF"/>
+                      </a:solidFill>
+                      <a:prstDash val="solid"/>
+                      <a:round/>
+                      <a:headEnd type="none" w="med" len="med"/>
+                      <a:tailEnd type="none" w="med" len="med"/>
+                    </a:lnL>
+                    <a:lnR w="9525" cap="flat" cmpd="sng" algn="ctr">
+                      <a:solidFill>
+                        <a:srgbClr val="FFFFFF"/>
+                      </a:solidFill>
+                      <a:prstDash val="solid"/>
+                      <a:round/>
+                      <a:headEnd type="none" w="med" len="med"/>
+                      <a:tailEnd type="none" w="med" len="med"/>
+                    </a:lnR>
+                    <a:lnT w="9525" cap="flat" cmpd="sng" algn="ctr">
+                      <a:solidFill>
+                        <a:srgbClr val="FFFFFF"/>
+                      </a:solidFill>
+                      <a:prstDash val="solid"/>
+                      <a:round/>
+                      <a:headEnd type="none" w="med" len="med"/>
+                      <a:tailEnd type="none" w="med" len="med"/>
+                    </a:lnT>
+                    <a:lnB w="9525" cap="flat" cmpd="sng" algn="ctr">
+                      <a:solidFill>
+                        <a:srgbClr val="FFFFFF"/>
+                      </a:solidFill>
+                      <a:prstDash val="solid"/>
+                      <a:round/>
+                      <a:headEnd type="none" w="med" len="med"/>
+                      <a:tailEnd type="none" w="med" len="med"/>
+                    </a:lnB>
+                    <a:solidFill>
+                      <a:srgbClr val="2174C7"/>
+                    </a:solidFill>
+                  </a:tcPr>
+                </a:tc>
+                <a:tc>
+                  <a:txBody>
+                    <a:bodyPr/>
+                    <a:lstStyle/>
+                    <a:p>
+                      <a:pPr algn="ctr"/>
+                      <a:r>
+                        <a:rPr lang="en-US" altLang="zh-CN" b="1" dirty="0">
+                          <a:solidFill>
+                            <a:schemeClr val="bg1"/>
+                          </a:solidFill>
+                          <a:effectLst/>
+                          <a:latin typeface="Helvetica" pitchFamily="2" charset="0"/>
+                        </a:rPr>
+                        <a:t>3</a:t>
+                      </a:r>
+                      <a:endParaRPr lang="zh-CN" altLang="en-US" b="1" dirty="0">
+                        <a:solidFill>
+                          <a:schemeClr val="bg1"/>
+                        </a:solidFill>
+                        <a:effectLst/>
+                        <a:latin typeface="Helvetica" pitchFamily="2" charset="0"/>
+                      </a:endParaRPr>
+                    </a:p>
+                  </a:txBody>
+                  <a:tcPr marL="38100" marR="38100" marT="38100" marB="38100" anchor="ctr">
+                    <a:lnL w="9525" cap="flat" cmpd="sng" algn="ctr">
+                      <a:solidFill>
+                        <a:srgbClr val="FFFFFF"/>
+                      </a:solidFill>
+                      <a:prstDash val="solid"/>
+                      <a:round/>
+                      <a:headEnd type="none" w="med" len="med"/>
+                      <a:tailEnd type="none" w="med" len="med"/>
+                    </a:lnL>
+                    <a:lnR w="9525" cap="flat" cmpd="sng" algn="ctr">
+                      <a:solidFill>
+                        <a:srgbClr val="FFFFFF"/>
+                      </a:solidFill>
+                      <a:prstDash val="solid"/>
+                      <a:round/>
+                      <a:headEnd type="none" w="med" len="med"/>
+                      <a:tailEnd type="none" w="med" len="med"/>
+                    </a:lnR>
+                    <a:lnT w="9525" cap="flat" cmpd="sng" algn="ctr">
+                      <a:solidFill>
+                        <a:srgbClr val="FFFFFF"/>
+                      </a:solidFill>
+                      <a:prstDash val="solid"/>
+                      <a:round/>
+                      <a:headEnd type="none" w="med" len="med"/>
+                      <a:tailEnd type="none" w="med" len="med"/>
+                    </a:lnT>
+                    <a:lnB w="9525" cap="flat" cmpd="sng" algn="ctr">
+                      <a:solidFill>
+                        <a:srgbClr val="FFFFFF"/>
+                      </a:solidFill>
+                      <a:prstDash val="solid"/>
+                      <a:round/>
+                      <a:headEnd type="none" w="med" len="med"/>
+                      <a:tailEnd type="none" w="med" len="med"/>
+                    </a:lnB>
+                    <a:solidFill>
+                      <a:srgbClr val="2174C7"/>
+                    </a:solidFill>
+                  </a:tcPr>
+                </a:tc>
+                <a:tc>
+                  <a:txBody>
+                    <a:bodyPr/>
+                    <a:lstStyle/>
+                    <a:p>
+                      <a:pPr algn="ctr"/>
+                      <a:r>
+                        <a:rPr lang="en-US" altLang="zh-CN" b="1" dirty="0">
+                          <a:solidFill>
+                            <a:schemeClr val="bg1"/>
+                          </a:solidFill>
+                          <a:effectLst/>
+                          <a:latin typeface="Helvetica" pitchFamily="2" charset="0"/>
+                        </a:rPr>
+                        <a:t>1</a:t>
+                      </a:r>
+                      <a:endParaRPr lang="zh-CN" altLang="en-US" b="1" dirty="0">
+                        <a:solidFill>
+                          <a:schemeClr val="bg1"/>
+                        </a:solidFill>
+                        <a:effectLst/>
+                        <a:latin typeface="Helvetica" pitchFamily="2" charset="0"/>
+                      </a:endParaRPr>
+                    </a:p>
+                  </a:txBody>
+                  <a:tcPr marL="38100" marR="38100" marT="38100" marB="38100" anchor="ctr">
+                    <a:lnL w="9525" cap="flat" cmpd="sng" algn="ctr">
+                      <a:solidFill>
+                        <a:srgbClr val="FFFFFF"/>
+                      </a:solidFill>
+                      <a:prstDash val="solid"/>
+                      <a:round/>
+                      <a:headEnd type="none" w="med" len="med"/>
+                      <a:tailEnd type="none" w="med" len="med"/>
+                    </a:lnL>
+                    <a:lnR w="9525" cap="flat" cmpd="sng" algn="ctr">
+                      <a:solidFill>
+                        <a:srgbClr val="FFFFFF"/>
+                      </a:solidFill>
+                      <a:prstDash val="solid"/>
+                      <a:round/>
+                      <a:headEnd type="none" w="med" len="med"/>
+                      <a:tailEnd type="none" w="med" len="med"/>
+                    </a:lnR>
+                    <a:lnT w="9525" cap="flat" cmpd="sng" algn="ctr">
+                      <a:solidFill>
+                        <a:srgbClr val="FFFFFF"/>
+                      </a:solidFill>
+                      <a:prstDash val="solid"/>
+                      <a:round/>
+                      <a:headEnd type="none" w="med" len="med"/>
+                      <a:tailEnd type="none" w="med" len="med"/>
+                    </a:lnT>
+                    <a:lnB w="9525" cap="flat" cmpd="sng" algn="ctr">
+                      <a:solidFill>
+                        <a:srgbClr val="FFFFFF"/>
+                      </a:solidFill>
+                      <a:prstDash val="solid"/>
+                      <a:round/>
+                      <a:headEnd type="none" w="med" len="med"/>
+                      <a:tailEnd type="none" w="med" len="med"/>
+                    </a:lnB>
+                    <a:solidFill>
+                      <a:srgbClr val="2174C7"/>
+                    </a:solidFill>
+                  </a:tcPr>
+                </a:tc>
+                <a:extLst>
+                  <a:ext uri="{0D108BD9-81ED-4DB2-BD59-A6C34878D82A}">
+                    <a16:rowId xmlns:a16="http://schemas.microsoft.com/office/drawing/2014/main" val="2465254908"/>
+                  </a:ext>
+                </a:extLst>
+              </a:tr>
+              <a:tr h="578037">
+                <a:tc>
+                  <a:txBody>
+                    <a:bodyPr/>
+                    <a:lstStyle/>
+                    <a:p>
+                      <a:pPr algn="ctr"/>
+                      <a:r>
+                        <a:rPr lang="en-US" altLang="zh-CN" b="1" dirty="0">
+                          <a:solidFill>
+                            <a:schemeClr val="bg1"/>
+                          </a:solidFill>
+                          <a:effectLst/>
+                          <a:latin typeface="Helvetica" pitchFamily="2" charset="0"/>
+                        </a:rPr>
+                        <a:t>1</a:t>
+                      </a:r>
+                      <a:endParaRPr lang="zh-CN" altLang="en-US" b="1" dirty="0">
+                        <a:solidFill>
+                          <a:schemeClr val="bg1"/>
+                        </a:solidFill>
+                        <a:effectLst/>
+                        <a:latin typeface="Helvetica" pitchFamily="2" charset="0"/>
+                      </a:endParaRPr>
+                    </a:p>
+                  </a:txBody>
+                  <a:tcPr marL="38100" marR="38100" marT="38100" marB="38100" anchor="ctr">
+                    <a:lnL w="9525" cap="flat" cmpd="sng" algn="ctr">
+                      <a:solidFill>
+                        <a:srgbClr val="FFFFFF"/>
+                      </a:solidFill>
+                      <a:prstDash val="solid"/>
+                      <a:round/>
+                      <a:headEnd type="none" w="med" len="med"/>
+                      <a:tailEnd type="none" w="med" len="med"/>
+                    </a:lnL>
+                    <a:lnR w="9525" cap="flat" cmpd="sng" algn="ctr">
+                      <a:solidFill>
+                        <a:srgbClr val="FFFFFF"/>
+                      </a:solidFill>
+                      <a:prstDash val="solid"/>
+                      <a:round/>
+                      <a:headEnd type="none" w="med" len="med"/>
+                      <a:tailEnd type="none" w="med" len="med"/>
+                    </a:lnR>
+                    <a:lnT w="9525" cap="flat" cmpd="sng" algn="ctr">
+                      <a:solidFill>
+                        <a:srgbClr val="FFFFFF"/>
+                      </a:solidFill>
+                      <a:prstDash val="solid"/>
+                      <a:round/>
+                      <a:headEnd type="none" w="med" len="med"/>
+                      <a:tailEnd type="none" w="med" len="med"/>
+                    </a:lnT>
+                    <a:lnB w="9525" cap="flat" cmpd="sng" algn="ctr">
+                      <a:solidFill>
+                        <a:srgbClr val="FFFFFF"/>
+                      </a:solidFill>
+                      <a:prstDash val="solid"/>
+                      <a:round/>
+                      <a:headEnd type="none" w="med" len="med"/>
+                      <a:tailEnd type="none" w="med" len="med"/>
+                    </a:lnB>
+                    <a:solidFill>
+                      <a:srgbClr val="2174C7"/>
+                    </a:solidFill>
+                  </a:tcPr>
+                </a:tc>
+                <a:tc>
+                  <a:txBody>
+                    <a:bodyPr/>
+                    <a:lstStyle/>
+                    <a:p>
+                      <a:pPr algn="ctr"/>
+                      <a:r>
+                        <a:rPr lang="en-US" altLang="zh-CN" b="1" dirty="0">
+                          <a:solidFill>
+                            <a:schemeClr val="bg1"/>
+                          </a:solidFill>
+                          <a:effectLst/>
+                          <a:latin typeface="Helvetica" pitchFamily="2" charset="0"/>
+                        </a:rPr>
+                        <a:t>2</a:t>
+                      </a:r>
+                      <a:endParaRPr lang="zh-CN" altLang="en-US" b="1" dirty="0">
+                        <a:solidFill>
+                          <a:schemeClr val="bg1"/>
+                        </a:solidFill>
+                        <a:effectLst/>
+                        <a:latin typeface="Helvetica" pitchFamily="2" charset="0"/>
+                      </a:endParaRPr>
+                    </a:p>
+                  </a:txBody>
+                  <a:tcPr marL="38100" marR="38100" marT="38100" marB="38100" anchor="ctr">
+                    <a:lnL w="9525" cap="flat" cmpd="sng" algn="ctr">
+                      <a:solidFill>
+                        <a:srgbClr val="FFFFFF"/>
+                      </a:solidFill>
+                      <a:prstDash val="solid"/>
+                      <a:round/>
+                      <a:headEnd type="none" w="med" len="med"/>
+                      <a:tailEnd type="none" w="med" len="med"/>
+                    </a:lnL>
+                    <a:lnR w="9525" cap="flat" cmpd="sng" algn="ctr">
+                      <a:solidFill>
+                        <a:srgbClr val="FFFFFF"/>
+                      </a:solidFill>
+                      <a:prstDash val="solid"/>
+                      <a:round/>
+                      <a:headEnd type="none" w="med" len="med"/>
+                      <a:tailEnd type="none" w="med" len="med"/>
+                    </a:lnR>
+                    <a:lnT w="9525" cap="flat" cmpd="sng" algn="ctr">
+                      <a:solidFill>
+                        <a:srgbClr val="FFFFFF"/>
+                      </a:solidFill>
+                      <a:prstDash val="solid"/>
+                      <a:round/>
+                      <a:headEnd type="none" w="med" len="med"/>
+                      <a:tailEnd type="none" w="med" len="med"/>
+                    </a:lnT>
+                    <a:lnB w="9525" cap="flat" cmpd="sng" algn="ctr">
+                      <a:solidFill>
+                        <a:srgbClr val="FFFFFF"/>
+                      </a:solidFill>
+                      <a:prstDash val="solid"/>
+                      <a:round/>
+                      <a:headEnd type="none" w="med" len="med"/>
+                      <a:tailEnd type="none" w="med" len="med"/>
+                    </a:lnB>
+                    <a:solidFill>
+                      <a:srgbClr val="2174C7"/>
+                    </a:solidFill>
+                  </a:tcPr>
+                </a:tc>
+                <a:tc>
+                  <a:txBody>
+                    <a:bodyPr/>
+                    <a:lstStyle/>
+                    <a:p>
+                      <a:pPr algn="ctr"/>
+                      <a:r>
+                        <a:rPr lang="en-US" altLang="zh-CN" b="1" dirty="0">
+                          <a:solidFill>
+                            <a:schemeClr val="bg1"/>
+                          </a:solidFill>
+                          <a:effectLst/>
+                          <a:latin typeface="Helvetica" pitchFamily="2" charset="0"/>
+                        </a:rPr>
+                        <a:t>1</a:t>
+                      </a:r>
+                      <a:endParaRPr lang="zh-CN" altLang="en-US" b="1" dirty="0">
+                        <a:solidFill>
+                          <a:schemeClr val="bg1"/>
+                        </a:solidFill>
+                        <a:effectLst/>
+                        <a:latin typeface="Helvetica" pitchFamily="2" charset="0"/>
+                      </a:endParaRPr>
+                    </a:p>
+                  </a:txBody>
+                  <a:tcPr marL="38100" marR="38100" marT="38100" marB="38100" anchor="ctr">
+                    <a:lnL w="9525" cap="flat" cmpd="sng" algn="ctr">
+                      <a:solidFill>
+                        <a:srgbClr val="FFFFFF"/>
+                      </a:solidFill>
+                      <a:prstDash val="solid"/>
+                      <a:round/>
+                      <a:headEnd type="none" w="med" len="med"/>
+                      <a:tailEnd type="none" w="med" len="med"/>
+                    </a:lnL>
+                    <a:lnR w="9525" cap="flat" cmpd="sng" algn="ctr">
+                      <a:solidFill>
+                        <a:srgbClr val="FFFFFF"/>
+                      </a:solidFill>
+                      <a:prstDash val="solid"/>
+                      <a:round/>
+                      <a:headEnd type="none" w="med" len="med"/>
+                      <a:tailEnd type="none" w="med" len="med"/>
+                    </a:lnR>
+                    <a:lnT w="9525" cap="flat" cmpd="sng" algn="ctr">
+                      <a:solidFill>
+                        <a:srgbClr val="FFFFFF"/>
+                      </a:solidFill>
+                      <a:prstDash val="solid"/>
+                      <a:round/>
+                      <a:headEnd type="none" w="med" len="med"/>
+                      <a:tailEnd type="none" w="med" len="med"/>
+                    </a:lnT>
+                    <a:lnB w="9525" cap="flat" cmpd="sng" algn="ctr">
+                      <a:solidFill>
+                        <a:srgbClr val="FFFFFF"/>
+                      </a:solidFill>
+                      <a:prstDash val="solid"/>
+                      <a:round/>
+                      <a:headEnd type="none" w="med" len="med"/>
+                      <a:tailEnd type="none" w="med" len="med"/>
+                    </a:lnB>
+                    <a:solidFill>
+                      <a:srgbClr val="2174C7"/>
+                    </a:solidFill>
+                  </a:tcPr>
+                </a:tc>
+                <a:tc>
+                  <a:txBody>
+                    <a:bodyPr/>
+                    <a:lstStyle/>
+                    <a:p>
+                      <a:pPr algn="ctr"/>
+                      <a:r>
+                        <a:rPr lang="en-US" altLang="zh-CN" b="1" dirty="0">
+                          <a:solidFill>
+                            <a:schemeClr val="bg1"/>
+                          </a:solidFill>
+                          <a:effectLst/>
+                          <a:latin typeface="Helvetica" pitchFamily="2" charset="0"/>
+                        </a:rPr>
+                        <a:t>0</a:t>
+                      </a:r>
+                      <a:endParaRPr lang="zh-CN" altLang="en-US" b="1" dirty="0">
+                        <a:solidFill>
+                          <a:schemeClr val="bg1"/>
+                        </a:solidFill>
+                        <a:effectLst/>
+                        <a:latin typeface="Helvetica" pitchFamily="2" charset="0"/>
+                      </a:endParaRPr>
+                    </a:p>
+                  </a:txBody>
+                  <a:tcPr marL="38100" marR="38100" marT="38100" marB="38100" anchor="ctr">
+                    <a:lnL w="9525" cap="flat" cmpd="sng" algn="ctr">
+                      <a:solidFill>
+                        <a:srgbClr val="FFFFFF"/>
+                      </a:solidFill>
+                      <a:prstDash val="solid"/>
+                      <a:round/>
+                      <a:headEnd type="none" w="med" len="med"/>
+                      <a:tailEnd type="none" w="med" len="med"/>
+                    </a:lnL>
+                    <a:lnR w="9525" cap="flat" cmpd="sng" algn="ctr">
+                      <a:solidFill>
+                        <a:srgbClr val="FFFFFF"/>
+                      </a:solidFill>
+                      <a:prstDash val="solid"/>
+                      <a:round/>
+                      <a:headEnd type="none" w="med" len="med"/>
+                      <a:tailEnd type="none" w="med" len="med"/>
+                    </a:lnR>
+                    <a:lnT w="9525" cap="flat" cmpd="sng" algn="ctr">
+                      <a:solidFill>
+                        <a:srgbClr val="FFFFFF"/>
+                      </a:solidFill>
+                      <a:prstDash val="solid"/>
+                      <a:round/>
+                      <a:headEnd type="none" w="med" len="med"/>
+                      <a:tailEnd type="none" w="med" len="med"/>
+                    </a:lnT>
+                    <a:lnB w="9525" cap="flat" cmpd="sng" algn="ctr">
+                      <a:solidFill>
+                        <a:srgbClr val="FFFFFF"/>
+                      </a:solidFill>
+                      <a:prstDash val="solid"/>
+                      <a:round/>
+                      <a:headEnd type="none" w="med" len="med"/>
+                      <a:tailEnd type="none" w="med" len="med"/>
+                    </a:lnB>
+                    <a:solidFill>
+                      <a:srgbClr val="2174C7"/>
+                    </a:solidFill>
+                  </a:tcPr>
+                </a:tc>
+                <a:tc>
+                  <a:txBody>
+                    <a:bodyPr/>
+                    <a:lstStyle/>
+                    <a:p>
+                      <a:pPr algn="ctr"/>
+                      <a:r>
+                        <a:rPr lang="en-US" altLang="zh-CN" b="1" dirty="0">
+                          <a:solidFill>
+                            <a:schemeClr val="bg1"/>
+                          </a:solidFill>
+                          <a:effectLst/>
+                          <a:latin typeface="Helvetica" pitchFamily="2" charset="0"/>
+                        </a:rPr>
+                        <a:t>0</a:t>
+                      </a:r>
+                      <a:endParaRPr lang="zh-CN" altLang="en-US" b="1" dirty="0">
+                        <a:solidFill>
+                          <a:schemeClr val="bg1"/>
+                        </a:solidFill>
+                        <a:effectLst/>
+                        <a:latin typeface="Helvetica" pitchFamily="2" charset="0"/>
+                      </a:endParaRPr>
+                    </a:p>
+                  </a:txBody>
+                  <a:tcPr marL="38100" marR="38100" marT="38100" marB="38100" anchor="ctr">
+                    <a:lnL w="9525" cap="flat" cmpd="sng" algn="ctr">
+                      <a:solidFill>
+                        <a:srgbClr val="FFFFFF"/>
+                      </a:solidFill>
+                      <a:prstDash val="solid"/>
+                      <a:round/>
+                      <a:headEnd type="none" w="med" len="med"/>
+                      <a:tailEnd type="none" w="med" len="med"/>
+                    </a:lnL>
+                    <a:lnR w="9525" cap="flat" cmpd="sng" algn="ctr">
+                      <a:solidFill>
+                        <a:srgbClr val="FFFFFF"/>
+                      </a:solidFill>
+                      <a:prstDash val="solid"/>
+                      <a:round/>
+                      <a:headEnd type="none" w="med" len="med"/>
+                      <a:tailEnd type="none" w="med" len="med"/>
+                    </a:lnR>
+                    <a:lnT w="9525" cap="flat" cmpd="sng" algn="ctr">
+                      <a:solidFill>
+                        <a:srgbClr val="FFFFFF"/>
+                      </a:solidFill>
+                      <a:prstDash val="solid"/>
+                      <a:round/>
+                      <a:headEnd type="none" w="med" len="med"/>
+                      <a:tailEnd type="none" w="med" len="med"/>
+                    </a:lnT>
+                    <a:lnB w="9525" cap="flat" cmpd="sng" algn="ctr">
+                      <a:solidFill>
+                        <a:srgbClr val="FFFFFF"/>
+                      </a:solidFill>
+                      <a:prstDash val="solid"/>
+                      <a:round/>
+                      <a:headEnd type="none" w="med" len="med"/>
+                      <a:tailEnd type="none" w="med" len="med"/>
+                    </a:lnB>
+                    <a:solidFill>
+                      <a:srgbClr val="2174C7"/>
+                    </a:solidFill>
+                  </a:tcPr>
+                </a:tc>
+                <a:extLst>
+                  <a:ext uri="{0D108BD9-81ED-4DB2-BD59-A6C34878D82A}">
+                    <a16:rowId xmlns:a16="http://schemas.microsoft.com/office/drawing/2014/main" val="1068142151"/>
+                  </a:ext>
+                </a:extLst>
+              </a:tr>
+              <a:tr h="578037">
+                <a:tc>
+                  <a:txBody>
+                    <a:bodyPr/>
+                    <a:lstStyle/>
+                    <a:p>
+                      <a:pPr algn="ctr"/>
+                      <a:r>
+                        <a:rPr lang="en-US" altLang="zh-CN" b="1" dirty="0">
+                          <a:solidFill>
+                            <a:schemeClr val="bg1"/>
+                          </a:solidFill>
+                          <a:effectLst/>
+                          <a:latin typeface="Helvetica" pitchFamily="2" charset="0"/>
+                        </a:rPr>
+                        <a:t>5</a:t>
+                      </a:r>
+                      <a:endParaRPr lang="zh-CN" altLang="en-US" b="1" dirty="0">
+                        <a:solidFill>
+                          <a:schemeClr val="bg1"/>
+                        </a:solidFill>
+                        <a:effectLst/>
+                        <a:latin typeface="Helvetica" pitchFamily="2" charset="0"/>
+                      </a:endParaRPr>
+                    </a:p>
+                  </a:txBody>
+                  <a:tcPr marL="38100" marR="38100" marT="38100" marB="38100" anchor="ctr">
+                    <a:lnL w="9525" cap="flat" cmpd="sng" algn="ctr">
+                      <a:solidFill>
+                        <a:srgbClr val="FFFFFF"/>
+                      </a:solidFill>
+                      <a:prstDash val="solid"/>
+                      <a:round/>
+                      <a:headEnd type="none" w="med" len="med"/>
+                      <a:tailEnd type="none" w="med" len="med"/>
+                    </a:lnL>
+                    <a:lnR w="9525" cap="flat" cmpd="sng" algn="ctr">
+                      <a:solidFill>
+                        <a:srgbClr val="FFFFFF"/>
+                      </a:solidFill>
+                      <a:prstDash val="solid"/>
+                      <a:round/>
+                      <a:headEnd type="none" w="med" len="med"/>
+                      <a:tailEnd type="none" w="med" len="med"/>
+                    </a:lnR>
+                    <a:lnT w="9525" cap="flat" cmpd="sng" algn="ctr">
+                      <a:solidFill>
+                        <a:srgbClr val="FFFFFF"/>
+                      </a:solidFill>
+                      <a:prstDash val="solid"/>
+                      <a:round/>
+                      <a:headEnd type="none" w="med" len="med"/>
+                      <a:tailEnd type="none" w="med" len="med"/>
+                    </a:lnT>
+                    <a:lnB w="9525" cap="flat" cmpd="sng" algn="ctr">
+                      <a:solidFill>
+                        <a:srgbClr val="FFFFFF"/>
+                      </a:solidFill>
+                      <a:prstDash val="solid"/>
+                      <a:round/>
+                      <a:headEnd type="none" w="med" len="med"/>
+                      <a:tailEnd type="none" w="med" len="med"/>
+                    </a:lnB>
+                    <a:solidFill>
+                      <a:srgbClr val="2174C7"/>
+                    </a:solidFill>
+                  </a:tcPr>
+                </a:tc>
+                <a:tc>
+                  <a:txBody>
+                    <a:bodyPr/>
+                    <a:lstStyle/>
+                    <a:p>
+                      <a:pPr algn="ctr"/>
+                      <a:r>
+                        <a:rPr lang="en-US" altLang="zh-CN" b="1" dirty="0">
+                          <a:solidFill>
+                            <a:schemeClr val="bg1"/>
+                          </a:solidFill>
+                          <a:effectLst/>
+                          <a:latin typeface="Helvetica" pitchFamily="2" charset="0"/>
+                        </a:rPr>
+                        <a:t>2</a:t>
+                      </a:r>
+                      <a:endParaRPr lang="zh-CN" altLang="en-US" b="1" dirty="0">
+                        <a:solidFill>
+                          <a:schemeClr val="bg1"/>
+                        </a:solidFill>
+                        <a:effectLst/>
+                        <a:latin typeface="Helvetica" pitchFamily="2" charset="0"/>
+                      </a:endParaRPr>
+                    </a:p>
+                  </a:txBody>
+                  <a:tcPr marL="38100" marR="38100" marT="38100" marB="38100" anchor="ctr">
+                    <a:lnL w="9525" cap="flat" cmpd="sng" algn="ctr">
+                      <a:solidFill>
+                        <a:srgbClr val="FFFFFF"/>
+                      </a:solidFill>
+                      <a:prstDash val="solid"/>
+                      <a:round/>
+                      <a:headEnd type="none" w="med" len="med"/>
+                      <a:tailEnd type="none" w="med" len="med"/>
+                    </a:lnL>
+                    <a:lnR w="9525" cap="flat" cmpd="sng" algn="ctr">
+                      <a:solidFill>
+                        <a:srgbClr val="FFFFFF"/>
+                      </a:solidFill>
+                      <a:prstDash val="solid"/>
+                      <a:round/>
+                      <a:headEnd type="none" w="med" len="med"/>
+                      <a:tailEnd type="none" w="med" len="med"/>
+                    </a:lnR>
+                    <a:lnT w="9525" cap="flat" cmpd="sng" algn="ctr">
+                      <a:solidFill>
+                        <a:srgbClr val="FFFFFF"/>
+                      </a:solidFill>
+                      <a:prstDash val="solid"/>
+                      <a:round/>
+                      <a:headEnd type="none" w="med" len="med"/>
+                      <a:tailEnd type="none" w="med" len="med"/>
+                    </a:lnT>
+                    <a:lnB w="9525" cap="flat" cmpd="sng" algn="ctr">
+                      <a:solidFill>
+                        <a:srgbClr val="FFFFFF"/>
+                      </a:solidFill>
+                      <a:prstDash val="solid"/>
+                      <a:round/>
+                      <a:headEnd type="none" w="med" len="med"/>
+                      <a:tailEnd type="none" w="med" len="med"/>
+                    </a:lnB>
+                    <a:solidFill>
+                      <a:srgbClr val="2174C7"/>
+                    </a:solidFill>
+                  </a:tcPr>
+                </a:tc>
+                <a:tc>
+                  <a:txBody>
+                    <a:bodyPr/>
+                    <a:lstStyle/>
+                    <a:p>
+                      <a:pPr algn="ctr"/>
+                      <a:r>
+                        <a:rPr lang="en-US" altLang="zh-CN" b="1" dirty="0">
+                          <a:solidFill>
+                            <a:schemeClr val="bg1"/>
+                          </a:solidFill>
+                          <a:effectLst/>
+                          <a:latin typeface="Helvetica" pitchFamily="2" charset="0"/>
+                        </a:rPr>
+                        <a:t>3</a:t>
+                      </a:r>
+                      <a:endParaRPr lang="zh-CN" altLang="en-US" b="1" dirty="0">
+                        <a:solidFill>
+                          <a:schemeClr val="bg1"/>
+                        </a:solidFill>
+                        <a:effectLst/>
+                        <a:latin typeface="Helvetica" pitchFamily="2" charset="0"/>
+                      </a:endParaRPr>
+                    </a:p>
+                  </a:txBody>
+                  <a:tcPr marL="38100" marR="38100" marT="38100" marB="38100" anchor="ctr">
+                    <a:lnL w="9525" cap="flat" cmpd="sng" algn="ctr">
+                      <a:solidFill>
+                        <a:srgbClr val="FFFFFF"/>
+                      </a:solidFill>
+                      <a:prstDash val="solid"/>
+                      <a:round/>
+                      <a:headEnd type="none" w="med" len="med"/>
+                      <a:tailEnd type="none" w="med" len="med"/>
+                    </a:lnL>
+                    <a:lnR w="9525" cap="flat" cmpd="sng" algn="ctr">
+                      <a:solidFill>
+                        <a:srgbClr val="FFFFFF"/>
+                      </a:solidFill>
+                      <a:prstDash val="solid"/>
+                      <a:round/>
+                      <a:headEnd type="none" w="med" len="med"/>
+                      <a:tailEnd type="none" w="med" len="med"/>
+                    </a:lnR>
+                    <a:lnT w="9525" cap="flat" cmpd="sng" algn="ctr">
+                      <a:solidFill>
+                        <a:srgbClr val="FFFFFF"/>
+                      </a:solidFill>
+                      <a:prstDash val="solid"/>
+                      <a:round/>
+                      <a:headEnd type="none" w="med" len="med"/>
+                      <a:tailEnd type="none" w="med" len="med"/>
+                    </a:lnT>
+                    <a:lnB w="9525" cap="flat" cmpd="sng" algn="ctr">
+                      <a:solidFill>
+                        <a:srgbClr val="FFFFFF"/>
+                      </a:solidFill>
+                      <a:prstDash val="solid"/>
+                      <a:round/>
+                      <a:headEnd type="none" w="med" len="med"/>
+                      <a:tailEnd type="none" w="med" len="med"/>
+                    </a:lnB>
+                    <a:solidFill>
+                      <a:srgbClr val="2174C7"/>
+                    </a:solidFill>
+                  </a:tcPr>
+                </a:tc>
+                <a:tc>
+                  <a:txBody>
+                    <a:bodyPr/>
+                    <a:lstStyle/>
+                    <a:p>
+                      <a:pPr algn="ctr"/>
+                      <a:r>
+                        <a:rPr lang="en-US" altLang="zh-CN" b="1" dirty="0">
+                          <a:solidFill>
+                            <a:schemeClr val="bg1"/>
+                          </a:solidFill>
+                          <a:effectLst/>
+                          <a:latin typeface="Helvetica" pitchFamily="2" charset="0"/>
+                        </a:rPr>
+                        <a:t>1</a:t>
+                      </a:r>
+                      <a:endParaRPr lang="zh-CN" altLang="en-US" b="1" dirty="0">
+                        <a:solidFill>
+                          <a:schemeClr val="bg1"/>
+                        </a:solidFill>
+                        <a:effectLst/>
+                        <a:latin typeface="Helvetica" pitchFamily="2" charset="0"/>
+                      </a:endParaRPr>
+                    </a:p>
+                  </a:txBody>
+                  <a:tcPr marL="38100" marR="38100" marT="38100" marB="38100" anchor="ctr">
+                    <a:lnL w="9525" cap="flat" cmpd="sng" algn="ctr">
+                      <a:solidFill>
+                        <a:srgbClr val="FFFFFF"/>
+                      </a:solidFill>
+                      <a:prstDash val="solid"/>
+                      <a:round/>
+                      <a:headEnd type="none" w="med" len="med"/>
+                      <a:tailEnd type="none" w="med" len="med"/>
+                    </a:lnL>
+                    <a:lnR w="9525" cap="flat" cmpd="sng" algn="ctr">
+                      <a:solidFill>
+                        <a:srgbClr val="FFFFFF"/>
+                      </a:solidFill>
+                      <a:prstDash val="solid"/>
+                      <a:round/>
+                      <a:headEnd type="none" w="med" len="med"/>
+                      <a:tailEnd type="none" w="med" len="med"/>
+                    </a:lnR>
+                    <a:lnT w="9525" cap="flat" cmpd="sng" algn="ctr">
+                      <a:solidFill>
+                        <a:srgbClr val="FFFFFF"/>
+                      </a:solidFill>
+                      <a:prstDash val="solid"/>
+                      <a:round/>
+                      <a:headEnd type="none" w="med" len="med"/>
+                      <a:tailEnd type="none" w="med" len="med"/>
+                    </a:lnT>
+                    <a:lnB w="9525" cap="flat" cmpd="sng" algn="ctr">
+                      <a:solidFill>
+                        <a:srgbClr val="FFFFFF"/>
+                      </a:solidFill>
+                      <a:prstDash val="solid"/>
+                      <a:round/>
+                      <a:headEnd type="none" w="med" len="med"/>
+                      <a:tailEnd type="none" w="med" len="med"/>
+                    </a:lnB>
+                    <a:solidFill>
+                      <a:srgbClr val="2174C7"/>
+                    </a:solidFill>
+                  </a:tcPr>
+                </a:tc>
+                <a:tc>
+                  <a:txBody>
+                    <a:bodyPr/>
+                    <a:lstStyle/>
+                    <a:p>
+                      <a:pPr algn="ctr"/>
+                      <a:r>
+                        <a:rPr lang="en-US" altLang="zh-CN" b="1" dirty="0">
+                          <a:solidFill>
+                            <a:schemeClr val="bg1"/>
+                          </a:solidFill>
+                          <a:effectLst/>
+                          <a:latin typeface="Helvetica" pitchFamily="2" charset="0"/>
+                        </a:rPr>
+                        <a:t>1</a:t>
+                      </a:r>
+                      <a:endParaRPr lang="zh-CN" altLang="en-US" b="1" dirty="0">
+                        <a:solidFill>
+                          <a:schemeClr val="bg1"/>
+                        </a:solidFill>
+                        <a:effectLst/>
+                        <a:latin typeface="Helvetica" pitchFamily="2" charset="0"/>
+                      </a:endParaRPr>
+                    </a:p>
+                  </a:txBody>
+                  <a:tcPr marL="38100" marR="38100" marT="38100" marB="38100" anchor="ctr">
+                    <a:lnL w="9525" cap="flat" cmpd="sng" algn="ctr">
+                      <a:solidFill>
+                        <a:srgbClr val="FFFFFF"/>
+                      </a:solidFill>
+                      <a:prstDash val="solid"/>
+                      <a:round/>
+                      <a:headEnd type="none" w="med" len="med"/>
+                      <a:tailEnd type="none" w="med" len="med"/>
+                    </a:lnL>
+                    <a:lnR w="9525" cap="flat" cmpd="sng" algn="ctr">
+                      <a:solidFill>
+                        <a:srgbClr val="FFFFFF"/>
+                      </a:solidFill>
+                      <a:prstDash val="solid"/>
+                      <a:round/>
+                      <a:headEnd type="none" w="med" len="med"/>
+                      <a:tailEnd type="none" w="med" len="med"/>
+                    </a:lnR>
+                    <a:lnT w="9525" cap="flat" cmpd="sng" algn="ctr">
+                      <a:solidFill>
+                        <a:srgbClr val="FFFFFF"/>
+                      </a:solidFill>
+                      <a:prstDash val="solid"/>
+                      <a:round/>
+                      <a:headEnd type="none" w="med" len="med"/>
+                      <a:tailEnd type="none" w="med" len="med"/>
+                    </a:lnT>
+                    <a:lnB w="9525" cap="flat" cmpd="sng" algn="ctr">
+                      <a:solidFill>
+                        <a:srgbClr val="FFFFFF"/>
+                      </a:solidFill>
+                      <a:prstDash val="solid"/>
+                      <a:round/>
+                      <a:headEnd type="none" w="med" len="med"/>
+                      <a:tailEnd type="none" w="med" len="med"/>
+                    </a:lnB>
+                    <a:solidFill>
+                      <a:srgbClr val="2174C7"/>
+                    </a:solidFill>
+                  </a:tcPr>
+                </a:tc>
+                <a:extLst>
+                  <a:ext uri="{0D108BD9-81ED-4DB2-BD59-A6C34878D82A}">
+                    <a16:rowId xmlns:a16="http://schemas.microsoft.com/office/drawing/2014/main" val="3497010048"/>
+                  </a:ext>
+                </a:extLst>
+              </a:tr>
+              <a:tr h="578037">
+                <a:tc>
+                  <a:txBody>
+                    <a:bodyPr/>
+                    <a:lstStyle/>
+                    <a:p>
+                      <a:pPr algn="ctr"/>
+                      <a:r>
+                        <a:rPr lang="en-US" altLang="zh-CN" b="1" dirty="0">
+                          <a:solidFill>
+                            <a:schemeClr val="bg1"/>
+                          </a:solidFill>
+                          <a:effectLst/>
+                          <a:latin typeface="Helvetica" pitchFamily="2" charset="0"/>
+                        </a:rPr>
+                        <a:t>2</a:t>
+                      </a:r>
+                      <a:endParaRPr lang="zh-CN" altLang="en-US" b="1" dirty="0">
+                        <a:solidFill>
+                          <a:schemeClr val="bg1"/>
+                        </a:solidFill>
+                        <a:effectLst/>
+                        <a:latin typeface="Helvetica" pitchFamily="2" charset="0"/>
+                      </a:endParaRPr>
+                    </a:p>
+                  </a:txBody>
+                  <a:tcPr marL="38100" marR="38100" marT="38100" marB="38100" anchor="ctr">
+                    <a:lnL w="9525" cap="flat" cmpd="sng" algn="ctr">
+                      <a:solidFill>
+                        <a:srgbClr val="FFFFFF"/>
+                      </a:solidFill>
+                      <a:prstDash val="solid"/>
+                      <a:round/>
+                      <a:headEnd type="none" w="med" len="med"/>
+                      <a:tailEnd type="none" w="med" len="med"/>
+                    </a:lnL>
+                    <a:lnR w="9525" cap="flat" cmpd="sng" algn="ctr">
+                      <a:solidFill>
+                        <a:srgbClr val="FFFFFF"/>
+                      </a:solidFill>
+                      <a:prstDash val="solid"/>
+                      <a:round/>
+                      <a:headEnd type="none" w="med" len="med"/>
+                      <a:tailEnd type="none" w="med" len="med"/>
+                    </a:lnR>
+                    <a:lnT w="9525" cap="flat" cmpd="sng" algn="ctr">
+                      <a:solidFill>
+                        <a:srgbClr val="FFFFFF"/>
+                      </a:solidFill>
+                      <a:prstDash val="solid"/>
+                      <a:round/>
+                      <a:headEnd type="none" w="med" len="med"/>
+                      <a:tailEnd type="none" w="med" len="med"/>
+                    </a:lnT>
+                    <a:lnB w="9525" cap="flat" cmpd="sng" algn="ctr">
+                      <a:solidFill>
+                        <a:srgbClr val="FFFFFF"/>
+                      </a:solidFill>
+                      <a:prstDash val="solid"/>
+                      <a:round/>
+                      <a:headEnd type="none" w="med" len="med"/>
+                      <a:tailEnd type="none" w="med" len="med"/>
+                    </a:lnB>
+                    <a:solidFill>
+                      <a:srgbClr val="2174C7"/>
+                    </a:solidFill>
+                  </a:tcPr>
+                </a:tc>
+                <a:tc>
+                  <a:txBody>
+                    <a:bodyPr/>
+                    <a:lstStyle/>
+                    <a:p>
+                      <a:pPr algn="ctr"/>
+                      <a:r>
+                        <a:rPr lang="en-US" altLang="zh-CN" b="1" dirty="0">
+                          <a:solidFill>
+                            <a:schemeClr val="bg1"/>
+                          </a:solidFill>
+                          <a:effectLst/>
+                          <a:latin typeface="Helvetica" pitchFamily="2" charset="0"/>
+                        </a:rPr>
+                        <a:t>1</a:t>
+                      </a:r>
+                      <a:endParaRPr lang="zh-CN" altLang="en-US" b="1" dirty="0">
+                        <a:solidFill>
+                          <a:schemeClr val="bg1"/>
+                        </a:solidFill>
+                        <a:effectLst/>
+                        <a:latin typeface="Helvetica" pitchFamily="2" charset="0"/>
+                      </a:endParaRPr>
+                    </a:p>
+                  </a:txBody>
+                  <a:tcPr marL="38100" marR="38100" marT="38100" marB="38100" anchor="ctr">
+                    <a:lnL w="9525" cap="flat" cmpd="sng" algn="ctr">
+                      <a:solidFill>
+                        <a:srgbClr val="FFFFFF"/>
+                      </a:solidFill>
+                      <a:prstDash val="solid"/>
+                      <a:round/>
+                      <a:headEnd type="none" w="med" len="med"/>
+                      <a:tailEnd type="none" w="med" len="med"/>
+                    </a:lnL>
+                    <a:lnR w="9525" cap="flat" cmpd="sng" algn="ctr">
+                      <a:solidFill>
+                        <a:srgbClr val="FFFFFF"/>
+                      </a:solidFill>
+                      <a:prstDash val="solid"/>
+                      <a:round/>
+                      <a:headEnd type="none" w="med" len="med"/>
+                      <a:tailEnd type="none" w="med" len="med"/>
+                    </a:lnR>
+                    <a:lnT w="9525" cap="flat" cmpd="sng" algn="ctr">
+                      <a:solidFill>
+                        <a:srgbClr val="FFFFFF"/>
+                      </a:solidFill>
+                      <a:prstDash val="solid"/>
+                      <a:round/>
+                      <a:headEnd type="none" w="med" len="med"/>
+                      <a:tailEnd type="none" w="med" len="med"/>
+                    </a:lnT>
+                    <a:lnB w="9525" cap="flat" cmpd="sng" algn="ctr">
+                      <a:solidFill>
+                        <a:srgbClr val="FFFFFF"/>
+                      </a:solidFill>
+                      <a:prstDash val="solid"/>
+                      <a:round/>
+                      <a:headEnd type="none" w="med" len="med"/>
+                      <a:tailEnd type="none" w="med" len="med"/>
+                    </a:lnB>
+                    <a:solidFill>
+                      <a:srgbClr val="2174C7"/>
+                    </a:solidFill>
+                  </a:tcPr>
+                </a:tc>
+                <a:tc>
+                  <a:txBody>
+                    <a:bodyPr/>
+                    <a:lstStyle/>
+                    <a:p>
+                      <a:pPr algn="ctr"/>
+                      <a:r>
+                        <a:rPr lang="en-US" altLang="zh-CN" b="1" dirty="0">
+                          <a:solidFill>
+                            <a:schemeClr val="bg1"/>
+                          </a:solidFill>
+                          <a:effectLst/>
+                          <a:latin typeface="Helvetica" pitchFamily="2" charset="0"/>
+                        </a:rPr>
+                        <a:t>0</a:t>
+                      </a:r>
+                      <a:endParaRPr lang="zh-CN" altLang="en-US" b="1" dirty="0">
+                        <a:solidFill>
+                          <a:schemeClr val="bg1"/>
+                        </a:solidFill>
+                        <a:effectLst/>
+                        <a:latin typeface="Helvetica" pitchFamily="2" charset="0"/>
+                      </a:endParaRPr>
+                    </a:p>
+                  </a:txBody>
+                  <a:tcPr marL="38100" marR="38100" marT="38100" marB="38100" anchor="ctr">
+                    <a:lnL w="9525" cap="flat" cmpd="sng" algn="ctr">
+                      <a:solidFill>
+                        <a:srgbClr val="FFFFFF"/>
+                      </a:solidFill>
+                      <a:prstDash val="solid"/>
+                      <a:round/>
+                      <a:headEnd type="none" w="med" len="med"/>
+                      <a:tailEnd type="none" w="med" len="med"/>
+                    </a:lnL>
+                    <a:lnR w="9525" cap="flat" cmpd="sng" algn="ctr">
+                      <a:solidFill>
+                        <a:srgbClr val="FFFFFF"/>
+                      </a:solidFill>
+                      <a:prstDash val="solid"/>
+                      <a:round/>
+                      <a:headEnd type="none" w="med" len="med"/>
+                      <a:tailEnd type="none" w="med" len="med"/>
+                    </a:lnR>
+                    <a:lnT w="9525" cap="flat" cmpd="sng" algn="ctr">
+                      <a:solidFill>
+                        <a:srgbClr val="FFFFFF"/>
+                      </a:solidFill>
+                      <a:prstDash val="solid"/>
+                      <a:round/>
+                      <a:headEnd type="none" w="med" len="med"/>
+                      <a:tailEnd type="none" w="med" len="med"/>
+                    </a:lnT>
+                    <a:lnB w="9525" cap="flat" cmpd="sng" algn="ctr">
+                      <a:solidFill>
+                        <a:srgbClr val="FFFFFF"/>
+                      </a:solidFill>
+                      <a:prstDash val="solid"/>
+                      <a:round/>
+                      <a:headEnd type="none" w="med" len="med"/>
+                      <a:tailEnd type="none" w="med" len="med"/>
+                    </a:lnB>
+                    <a:solidFill>
+                      <a:srgbClr val="2174C7"/>
+                    </a:solidFill>
+                  </a:tcPr>
+                </a:tc>
+                <a:tc>
+                  <a:txBody>
+                    <a:bodyPr/>
+                    <a:lstStyle/>
+                    <a:p>
+                      <a:pPr algn="ctr"/>
+                      <a:r>
+                        <a:rPr lang="en-US" altLang="zh-CN" b="1" dirty="0">
+                          <a:solidFill>
+                            <a:schemeClr val="bg1"/>
+                          </a:solidFill>
+                          <a:effectLst/>
+                          <a:latin typeface="Helvetica" pitchFamily="2" charset="0"/>
+                        </a:rPr>
+                        <a:t>1</a:t>
+                      </a:r>
+                      <a:endParaRPr lang="zh-CN" altLang="en-US" b="1" dirty="0">
+                        <a:solidFill>
+                          <a:schemeClr val="bg1"/>
+                        </a:solidFill>
+                        <a:effectLst/>
+                        <a:latin typeface="Helvetica" pitchFamily="2" charset="0"/>
+                      </a:endParaRPr>
+                    </a:p>
+                  </a:txBody>
+                  <a:tcPr marL="38100" marR="38100" marT="38100" marB="38100" anchor="ctr">
+                    <a:lnL w="9525" cap="flat" cmpd="sng" algn="ctr">
+                      <a:solidFill>
+                        <a:srgbClr val="FFFFFF"/>
+                      </a:solidFill>
+                      <a:prstDash val="solid"/>
+                      <a:round/>
+                      <a:headEnd type="none" w="med" len="med"/>
+                      <a:tailEnd type="none" w="med" len="med"/>
+                    </a:lnL>
+                    <a:lnR w="9525" cap="flat" cmpd="sng" algn="ctr">
+                      <a:solidFill>
+                        <a:srgbClr val="FFFFFF"/>
+                      </a:solidFill>
+                      <a:prstDash val="solid"/>
+                      <a:round/>
+                      <a:headEnd type="none" w="med" len="med"/>
+                      <a:tailEnd type="none" w="med" len="med"/>
+                    </a:lnR>
+                    <a:lnT w="9525" cap="flat" cmpd="sng" algn="ctr">
+                      <a:solidFill>
+                        <a:srgbClr val="FFFFFF"/>
+                      </a:solidFill>
+                      <a:prstDash val="solid"/>
+                      <a:round/>
+                      <a:headEnd type="none" w="med" len="med"/>
+                      <a:tailEnd type="none" w="med" len="med"/>
+                    </a:lnT>
+                    <a:lnB w="9525" cap="flat" cmpd="sng" algn="ctr">
+                      <a:solidFill>
+                        <a:srgbClr val="FFFFFF"/>
+                      </a:solidFill>
+                      <a:prstDash val="solid"/>
+                      <a:round/>
+                      <a:headEnd type="none" w="med" len="med"/>
+                      <a:tailEnd type="none" w="med" len="med"/>
+                    </a:lnB>
+                    <a:solidFill>
+                      <a:srgbClr val="2174C7"/>
+                    </a:solidFill>
+                  </a:tcPr>
+                </a:tc>
+                <a:tc>
+                  <a:txBody>
+                    <a:bodyPr/>
+                    <a:lstStyle/>
+                    <a:p>
+                      <a:pPr algn="ctr"/>
+                      <a:r>
+                        <a:rPr lang="en-US" altLang="zh-CN" b="1" dirty="0">
+                          <a:solidFill>
+                            <a:schemeClr val="bg1"/>
+                          </a:solidFill>
+                          <a:effectLst/>
+                          <a:latin typeface="Helvetica" pitchFamily="2" charset="0"/>
+                        </a:rPr>
+                        <a:t>1</a:t>
+                      </a:r>
+                      <a:endParaRPr lang="zh-CN" altLang="en-US" b="1" dirty="0">
+                        <a:solidFill>
+                          <a:schemeClr val="bg1"/>
+                        </a:solidFill>
+                        <a:effectLst/>
+                        <a:latin typeface="Helvetica" pitchFamily="2" charset="0"/>
+                      </a:endParaRPr>
+                    </a:p>
+                  </a:txBody>
+                  <a:tcPr marL="38100" marR="38100" marT="38100" marB="38100" anchor="ctr">
+                    <a:lnL w="9525" cap="flat" cmpd="sng" algn="ctr">
+                      <a:solidFill>
+                        <a:srgbClr val="FFFFFF"/>
+                      </a:solidFill>
+                      <a:prstDash val="solid"/>
+                      <a:round/>
+                      <a:headEnd type="none" w="med" len="med"/>
+                      <a:tailEnd type="none" w="med" len="med"/>
+                    </a:lnL>
+                    <a:lnR w="9525" cap="flat" cmpd="sng" algn="ctr">
+                      <a:solidFill>
+                        <a:srgbClr val="FFFFFF"/>
+                      </a:solidFill>
+                      <a:prstDash val="solid"/>
+                      <a:round/>
+                      <a:headEnd type="none" w="med" len="med"/>
+                      <a:tailEnd type="none" w="med" len="med"/>
+                    </a:lnR>
+                    <a:lnT w="9525" cap="flat" cmpd="sng" algn="ctr">
+                      <a:solidFill>
+                        <a:srgbClr val="FFFFFF"/>
+                      </a:solidFill>
+                      <a:prstDash val="solid"/>
+                      <a:round/>
+                      <a:headEnd type="none" w="med" len="med"/>
+                      <a:tailEnd type="none" w="med" len="med"/>
+                    </a:lnT>
+                    <a:lnB w="9525" cap="flat" cmpd="sng" algn="ctr">
+                      <a:solidFill>
+                        <a:srgbClr val="FFFFFF"/>
+                      </a:solidFill>
+                      <a:prstDash val="solid"/>
+                      <a:round/>
+                      <a:headEnd type="none" w="med" len="med"/>
+                      <a:tailEnd type="none" w="med" len="med"/>
+                    </a:lnB>
+                    <a:solidFill>
+                      <a:srgbClr val="2174C7"/>
+                    </a:solidFill>
+                  </a:tcPr>
+                </a:tc>
+                <a:extLst>
+                  <a:ext uri="{0D108BD9-81ED-4DB2-BD59-A6C34878D82A}">
+                    <a16:rowId xmlns:a16="http://schemas.microsoft.com/office/drawing/2014/main" val="499594329"/>
+                  </a:ext>
+                </a:extLst>
+              </a:tr>
+            </a:tbl>
+          </a:graphicData>
+        </a:graphic>
+      </p:graphicFrame>
+      <p:graphicFrame>
+        <p:nvGraphicFramePr>
+          <p:cNvPr id="4" name="表格 3">
+            <a:extLst>
+              <a:ext uri="{FF2B5EF4-FFF2-40B4-BE49-F238E27FC236}">
+                <a16:creationId xmlns:a16="http://schemas.microsoft.com/office/drawing/2014/main" id="{36026AA5-F1A8-2744-BDD5-F16F23C07E99}"/>
+              </a:ext>
+            </a:extLst>
+          </p:cNvPr>
+          <p:cNvGraphicFramePr>
+            <a:graphicFrameLocks noGrp="1"/>
+          </p:cNvGraphicFramePr>
+          <p:nvPr>
+            <p:extLst>
+              <p:ext uri="{D42A27DB-BD31-4B8C-83A1-F6EECF244321}">
+                <p14:modId xmlns:p14="http://schemas.microsoft.com/office/powerpoint/2010/main" val="1303397630"/>
+              </p:ext>
+            </p:extLst>
+          </p:nvPr>
+        </p:nvGraphicFramePr>
+        <p:xfrm>
+          <a:off x="4767309" y="1106496"/>
+          <a:ext cx="1642766" cy="1629172"/>
+        </p:xfrm>
+        <a:graphic>
+          <a:graphicData uri="http://schemas.openxmlformats.org/drawingml/2006/table">
+            <a:tbl>
+              <a:tblPr/>
+              <a:tblGrid>
+                <a:gridCol w="523608">
+                  <a:extLst>
+                    <a:ext uri="{9D8B030D-6E8A-4147-A177-3AD203B41FA5}">
+                      <a16:colId xmlns:a16="http://schemas.microsoft.com/office/drawing/2014/main" val="2060692951"/>
+                    </a:ext>
+                  </a:extLst>
+                </a:gridCol>
+                <a:gridCol w="544456">
+                  <a:extLst>
+                    <a:ext uri="{9D8B030D-6E8A-4147-A177-3AD203B41FA5}">
+                      <a16:colId xmlns:a16="http://schemas.microsoft.com/office/drawing/2014/main" val="4289742241"/>
+                    </a:ext>
+                  </a:extLst>
+                </a:gridCol>
+                <a:gridCol w="574702">
+                  <a:extLst>
+                    <a:ext uri="{9D8B030D-6E8A-4147-A177-3AD203B41FA5}">
+                      <a16:colId xmlns:a16="http://schemas.microsoft.com/office/drawing/2014/main" val="2434985697"/>
+                    </a:ext>
+                  </a:extLst>
+                </a:gridCol>
+              </a:tblGrid>
+              <a:tr h="632480">
+                <a:tc>
+                  <a:txBody>
+                    <a:bodyPr/>
+                    <a:lstStyle/>
+                    <a:p>
+                      <a:pPr algn="dist"/>
+                      <a:endParaRPr lang="zh-CN" altLang="en-US" b="1" dirty="0">
+                        <a:solidFill>
+                          <a:schemeClr val="bg1"/>
+                        </a:solidFill>
+                        <a:effectLst/>
+                        <a:latin typeface="Helvetica" pitchFamily="2" charset="0"/>
+                      </a:endParaRPr>
+                    </a:p>
+                  </a:txBody>
+                  <a:tcPr marL="38100" marR="38100" marT="38100" marB="38100" anchor="ctr">
+                    <a:lnL w="9525" cap="flat" cmpd="sng" algn="ctr">
+                      <a:solidFill>
+                        <a:srgbClr val="FFFFFF"/>
+                      </a:solidFill>
+                      <a:prstDash val="solid"/>
+                      <a:round/>
+                      <a:headEnd type="none" w="med" len="med"/>
+                      <a:tailEnd type="none" w="med" len="med"/>
+                    </a:lnL>
+                    <a:lnR w="9525" cap="flat" cmpd="sng" algn="ctr">
+                      <a:solidFill>
+                        <a:srgbClr val="FFFFFF"/>
+                      </a:solidFill>
+                      <a:prstDash val="solid"/>
+                      <a:round/>
+                      <a:headEnd type="none" w="med" len="med"/>
+                      <a:tailEnd type="none" w="med" len="med"/>
+                    </a:lnR>
+                    <a:lnT w="9525" cap="flat" cmpd="sng" algn="ctr">
+                      <a:solidFill>
+                        <a:srgbClr val="FFFFFF"/>
+                      </a:solidFill>
+                      <a:prstDash val="solid"/>
+                      <a:round/>
+                      <a:headEnd type="none" w="med" len="med"/>
+                      <a:tailEnd type="none" w="med" len="med"/>
+                    </a:lnT>
+                    <a:lnB w="9525" cap="flat" cmpd="sng" algn="ctr">
+                      <a:solidFill>
+                        <a:srgbClr val="FFFFFF"/>
+                      </a:solidFill>
+                      <a:prstDash val="solid"/>
+                      <a:round/>
+                      <a:headEnd type="none" w="med" len="med"/>
+                      <a:tailEnd type="none" w="med" len="med"/>
+                    </a:lnB>
+                    <a:solidFill>
+                      <a:srgbClr val="00568A">
+                        <a:alpha val="63781"/>
+                      </a:srgbClr>
+                    </a:solidFill>
+                  </a:tcPr>
+                </a:tc>
+                <a:tc>
+                  <a:txBody>
+                    <a:bodyPr/>
+                    <a:lstStyle/>
+                    <a:p>
+                      <a:pPr algn="dist"/>
+                      <a:endParaRPr lang="zh-CN" altLang="en-US" b="1" dirty="0">
+                        <a:solidFill>
+                          <a:schemeClr val="bg1"/>
+                        </a:solidFill>
+                        <a:effectLst/>
+                        <a:latin typeface="Helvetica" pitchFamily="2" charset="0"/>
+                      </a:endParaRPr>
+                    </a:p>
+                  </a:txBody>
+                  <a:tcPr marL="38100" marR="38100" marT="38100" marB="38100" anchor="ctr">
+                    <a:lnL w="9525" cap="flat" cmpd="sng" algn="ctr">
+                      <a:solidFill>
+                        <a:srgbClr val="FFFFFF"/>
+                      </a:solidFill>
+                      <a:prstDash val="solid"/>
+                      <a:round/>
+                      <a:headEnd type="none" w="med" len="med"/>
+                      <a:tailEnd type="none" w="med" len="med"/>
+                    </a:lnL>
+                    <a:lnR w="9525" cap="flat" cmpd="sng" algn="ctr">
+                      <a:solidFill>
+                        <a:srgbClr val="FFFFFF"/>
+                      </a:solidFill>
+                      <a:prstDash val="solid"/>
+                      <a:round/>
+                      <a:headEnd type="none" w="med" len="med"/>
+                      <a:tailEnd type="none" w="med" len="med"/>
+                    </a:lnR>
+                    <a:lnT w="9525" cap="flat" cmpd="sng" algn="ctr">
+                      <a:solidFill>
+                        <a:srgbClr val="FFFFFF"/>
+                      </a:solidFill>
+                      <a:prstDash val="solid"/>
+                      <a:round/>
+                      <a:headEnd type="none" w="med" len="med"/>
+                      <a:tailEnd type="none" w="med" len="med"/>
+                    </a:lnT>
+                    <a:lnB w="9525" cap="flat" cmpd="sng" algn="ctr">
+                      <a:solidFill>
+                        <a:srgbClr val="FFFFFF"/>
+                      </a:solidFill>
+                      <a:prstDash val="solid"/>
+                      <a:round/>
+                      <a:headEnd type="none" w="med" len="med"/>
+                      <a:tailEnd type="none" w="med" len="med"/>
+                    </a:lnB>
+                    <a:solidFill>
+                      <a:srgbClr val="00568A">
+                        <a:alpha val="63781"/>
+                      </a:srgbClr>
+                    </a:solidFill>
+                  </a:tcPr>
+                </a:tc>
+                <a:tc>
+                  <a:txBody>
+                    <a:bodyPr/>
+                    <a:lstStyle/>
+                    <a:p>
+                      <a:pPr algn="dist"/>
+                      <a:endParaRPr lang="zh-CN" altLang="en-US" b="1" dirty="0">
+                        <a:solidFill>
+                          <a:schemeClr val="bg1"/>
+                        </a:solidFill>
+                        <a:effectLst/>
+                        <a:latin typeface="Helvetica" pitchFamily="2" charset="0"/>
+                      </a:endParaRPr>
+                    </a:p>
+                  </a:txBody>
+                  <a:tcPr marL="38100" marR="38100" marT="38100" marB="38100" anchor="ctr">
+                    <a:lnL w="9525" cap="flat" cmpd="sng" algn="ctr">
+                      <a:solidFill>
+                        <a:srgbClr val="FFFFFF"/>
+                      </a:solidFill>
+                      <a:prstDash val="solid"/>
+                      <a:round/>
+                      <a:headEnd type="none" w="med" len="med"/>
+                      <a:tailEnd type="none" w="med" len="med"/>
+                    </a:lnL>
+                    <a:lnR w="9525" cap="flat" cmpd="sng" algn="ctr">
+                      <a:solidFill>
+                        <a:srgbClr val="FFFFFF"/>
+                      </a:solidFill>
+                      <a:prstDash val="solid"/>
+                      <a:round/>
+                      <a:headEnd type="none" w="med" len="med"/>
+                      <a:tailEnd type="none" w="med" len="med"/>
+                    </a:lnR>
+                    <a:lnT w="9525" cap="flat" cmpd="sng" algn="ctr">
+                      <a:solidFill>
+                        <a:srgbClr val="FFFFFF"/>
+                      </a:solidFill>
+                      <a:prstDash val="solid"/>
+                      <a:round/>
+                      <a:headEnd type="none" w="med" len="med"/>
+                      <a:tailEnd type="none" w="med" len="med"/>
+                    </a:lnT>
+                    <a:lnB w="9525" cap="flat" cmpd="sng" algn="ctr">
+                      <a:solidFill>
+                        <a:srgbClr val="FFFFFF"/>
+                      </a:solidFill>
+                      <a:prstDash val="solid"/>
+                      <a:round/>
+                      <a:headEnd type="none" w="med" len="med"/>
+                      <a:tailEnd type="none" w="med" len="med"/>
+                    </a:lnB>
+                    <a:solidFill>
+                      <a:srgbClr val="00568A">
+                        <a:alpha val="63781"/>
+                      </a:srgbClr>
+                    </a:solidFill>
+                  </a:tcPr>
+                </a:tc>
+                <a:extLst>
+                  <a:ext uri="{0D108BD9-81ED-4DB2-BD59-A6C34878D82A}">
+                    <a16:rowId xmlns:a16="http://schemas.microsoft.com/office/drawing/2014/main" val="3900857988"/>
+                  </a:ext>
+                </a:extLst>
+              </a:tr>
+              <a:tr h="464701">
+                <a:tc>
+                  <a:txBody>
+                    <a:bodyPr/>
+                    <a:lstStyle/>
+                    <a:p>
+                      <a:pPr algn="dist"/>
+                      <a:endParaRPr lang="zh-CN" altLang="en-US" b="1" dirty="0">
+                        <a:solidFill>
+                          <a:schemeClr val="bg1"/>
+                        </a:solidFill>
+                        <a:effectLst/>
+                        <a:latin typeface="Helvetica" pitchFamily="2" charset="0"/>
+                      </a:endParaRPr>
+                    </a:p>
+                  </a:txBody>
+                  <a:tcPr marL="38100" marR="38100" marT="38100" marB="38100" anchor="ctr">
+                    <a:lnL w="9525" cap="flat" cmpd="sng" algn="ctr">
+                      <a:solidFill>
+                        <a:srgbClr val="FFFFFF"/>
+                      </a:solidFill>
+                      <a:prstDash val="solid"/>
+                      <a:round/>
+                      <a:headEnd type="none" w="med" len="med"/>
+                      <a:tailEnd type="none" w="med" len="med"/>
+                    </a:lnL>
+                    <a:lnR w="9525" cap="flat" cmpd="sng" algn="ctr">
+                      <a:solidFill>
+                        <a:srgbClr val="FFFFFF"/>
+                      </a:solidFill>
+                      <a:prstDash val="solid"/>
+                      <a:round/>
+                      <a:headEnd type="none" w="med" len="med"/>
+                      <a:tailEnd type="none" w="med" len="med"/>
+                    </a:lnR>
+                    <a:lnT w="9525" cap="flat" cmpd="sng" algn="ctr">
+                      <a:solidFill>
+                        <a:srgbClr val="FFFFFF"/>
+                      </a:solidFill>
+                      <a:prstDash val="solid"/>
+                      <a:round/>
+                      <a:headEnd type="none" w="med" len="med"/>
+                      <a:tailEnd type="none" w="med" len="med"/>
+                    </a:lnT>
+                    <a:lnB w="9525" cap="flat" cmpd="sng" algn="ctr">
+                      <a:solidFill>
+                        <a:srgbClr val="FFFFFF"/>
+                      </a:solidFill>
+                      <a:prstDash val="solid"/>
+                      <a:round/>
+                      <a:headEnd type="none" w="med" len="med"/>
+                      <a:tailEnd type="none" w="med" len="med"/>
+                    </a:lnB>
+                    <a:solidFill>
+                      <a:srgbClr val="00568A">
+                        <a:alpha val="63781"/>
+                      </a:srgbClr>
+                    </a:solidFill>
+                  </a:tcPr>
+                </a:tc>
+                <a:tc>
+                  <a:txBody>
+                    <a:bodyPr/>
+                    <a:lstStyle/>
+                    <a:p>
+                      <a:pPr algn="dist"/>
+                      <a:endParaRPr lang="zh-CN" altLang="en-US" b="1" dirty="0">
+                        <a:solidFill>
+                          <a:schemeClr val="bg1"/>
+                        </a:solidFill>
+                        <a:effectLst/>
+                        <a:latin typeface="Helvetica" pitchFamily="2" charset="0"/>
+                      </a:endParaRPr>
+                    </a:p>
+                  </a:txBody>
+                  <a:tcPr marL="38100" marR="38100" marT="38100" marB="38100" anchor="ctr">
+                    <a:lnL w="9525" cap="flat" cmpd="sng" algn="ctr">
+                      <a:solidFill>
+                        <a:srgbClr val="FFFFFF"/>
+                      </a:solidFill>
+                      <a:prstDash val="solid"/>
+                      <a:round/>
+                      <a:headEnd type="none" w="med" len="med"/>
+                      <a:tailEnd type="none" w="med" len="med"/>
+                    </a:lnL>
+                    <a:lnR w="9525" cap="flat" cmpd="sng" algn="ctr">
+                      <a:solidFill>
+                        <a:srgbClr val="FFFFFF"/>
+                      </a:solidFill>
+                      <a:prstDash val="solid"/>
+                      <a:round/>
+                      <a:headEnd type="none" w="med" len="med"/>
+                      <a:tailEnd type="none" w="med" len="med"/>
+                    </a:lnR>
+                    <a:lnT w="9525" cap="flat" cmpd="sng" algn="ctr">
+                      <a:solidFill>
+                        <a:srgbClr val="FFFFFF"/>
+                      </a:solidFill>
+                      <a:prstDash val="solid"/>
+                      <a:round/>
+                      <a:headEnd type="none" w="med" len="med"/>
+                      <a:tailEnd type="none" w="med" len="med"/>
+                    </a:lnT>
+                    <a:lnB w="9525" cap="flat" cmpd="sng" algn="ctr">
+                      <a:solidFill>
+                        <a:srgbClr val="FFFFFF"/>
+                      </a:solidFill>
+                      <a:prstDash val="solid"/>
+                      <a:round/>
+                      <a:headEnd type="none" w="med" len="med"/>
+                      <a:tailEnd type="none" w="med" len="med"/>
+                    </a:lnB>
+                    <a:solidFill>
+                      <a:srgbClr val="00568A">
+                        <a:alpha val="63781"/>
+                      </a:srgbClr>
+                    </a:solidFill>
+                  </a:tcPr>
+                </a:tc>
+                <a:tc>
+                  <a:txBody>
+                    <a:bodyPr/>
+                    <a:lstStyle/>
+                    <a:p>
+                      <a:pPr algn="dist"/>
+                      <a:endParaRPr lang="zh-CN" altLang="en-US" b="1" dirty="0">
+                        <a:solidFill>
+                          <a:schemeClr val="bg1"/>
+                        </a:solidFill>
+                        <a:effectLst/>
+                        <a:latin typeface="Helvetica" pitchFamily="2" charset="0"/>
+                      </a:endParaRPr>
+                    </a:p>
+                  </a:txBody>
+                  <a:tcPr marL="38100" marR="38100" marT="38100" marB="38100" anchor="ctr">
+                    <a:lnL w="9525" cap="flat" cmpd="sng" algn="ctr">
+                      <a:solidFill>
+                        <a:srgbClr val="FFFFFF"/>
+                      </a:solidFill>
+                      <a:prstDash val="solid"/>
+                      <a:round/>
+                      <a:headEnd type="none" w="med" len="med"/>
+                      <a:tailEnd type="none" w="med" len="med"/>
+                    </a:lnL>
+                    <a:lnR w="9525" cap="flat" cmpd="sng" algn="ctr">
+                      <a:solidFill>
+                        <a:srgbClr val="FFFFFF"/>
+                      </a:solidFill>
+                      <a:prstDash val="solid"/>
+                      <a:round/>
+                      <a:headEnd type="none" w="med" len="med"/>
+                      <a:tailEnd type="none" w="med" len="med"/>
+                    </a:lnR>
+                    <a:lnT w="9525" cap="flat" cmpd="sng" algn="ctr">
+                      <a:solidFill>
+                        <a:srgbClr val="FFFFFF"/>
+                      </a:solidFill>
+                      <a:prstDash val="solid"/>
+                      <a:round/>
+                      <a:headEnd type="none" w="med" len="med"/>
+                      <a:tailEnd type="none" w="med" len="med"/>
+                    </a:lnT>
+                    <a:lnB w="9525" cap="flat" cmpd="sng" algn="ctr">
+                      <a:solidFill>
+                        <a:srgbClr val="FFFFFF"/>
+                      </a:solidFill>
+                      <a:prstDash val="solid"/>
+                      <a:round/>
+                      <a:headEnd type="none" w="med" len="med"/>
+                      <a:tailEnd type="none" w="med" len="med"/>
+                    </a:lnB>
+                    <a:solidFill>
+                      <a:srgbClr val="00568A">
+                        <a:alpha val="63781"/>
+                      </a:srgbClr>
+                    </a:solidFill>
+                  </a:tcPr>
+                </a:tc>
+                <a:extLst>
+                  <a:ext uri="{0D108BD9-81ED-4DB2-BD59-A6C34878D82A}">
+                    <a16:rowId xmlns:a16="http://schemas.microsoft.com/office/drawing/2014/main" val="2035568097"/>
+                  </a:ext>
+                </a:extLst>
+              </a:tr>
+              <a:tr h="531991">
+                <a:tc>
+                  <a:txBody>
+                    <a:bodyPr/>
+                    <a:lstStyle/>
+                    <a:p>
+                      <a:pPr algn="dist"/>
+                      <a:endParaRPr lang="zh-CN" altLang="en-US" b="1" dirty="0">
+                        <a:solidFill>
+                          <a:schemeClr val="bg1"/>
+                        </a:solidFill>
+                        <a:effectLst/>
+                        <a:latin typeface="Helvetica" pitchFamily="2" charset="0"/>
+                      </a:endParaRPr>
+                    </a:p>
+                  </a:txBody>
+                  <a:tcPr marL="38100" marR="38100" marT="38100" marB="38100" anchor="ctr">
+                    <a:lnL w="9525" cap="flat" cmpd="sng" algn="ctr">
+                      <a:solidFill>
+                        <a:srgbClr val="FFFFFF"/>
+                      </a:solidFill>
+                      <a:prstDash val="solid"/>
+                      <a:round/>
+                      <a:headEnd type="none" w="med" len="med"/>
+                      <a:tailEnd type="none" w="med" len="med"/>
+                    </a:lnL>
+                    <a:lnR w="9525" cap="flat" cmpd="sng" algn="ctr">
+                      <a:solidFill>
+                        <a:srgbClr val="FFFFFF"/>
+                      </a:solidFill>
+                      <a:prstDash val="solid"/>
+                      <a:round/>
+                      <a:headEnd type="none" w="med" len="med"/>
+                      <a:tailEnd type="none" w="med" len="med"/>
+                    </a:lnR>
+                    <a:lnT w="9525" cap="flat" cmpd="sng" algn="ctr">
+                      <a:solidFill>
+                        <a:srgbClr val="FFFFFF"/>
+                      </a:solidFill>
+                      <a:prstDash val="solid"/>
+                      <a:round/>
+                      <a:headEnd type="none" w="med" len="med"/>
+                      <a:tailEnd type="none" w="med" len="med"/>
+                    </a:lnT>
+                    <a:lnB w="9525" cap="flat" cmpd="sng" algn="ctr">
+                      <a:solidFill>
+                        <a:srgbClr val="FFFFFF"/>
+                      </a:solidFill>
+                      <a:prstDash val="solid"/>
+                      <a:round/>
+                      <a:headEnd type="none" w="med" len="med"/>
+                      <a:tailEnd type="none" w="med" len="med"/>
+                    </a:lnB>
+                    <a:solidFill>
+                      <a:srgbClr val="00568A">
+                        <a:alpha val="63781"/>
+                      </a:srgbClr>
+                    </a:solidFill>
+                  </a:tcPr>
+                </a:tc>
+                <a:tc>
+                  <a:txBody>
+                    <a:bodyPr/>
+                    <a:lstStyle/>
+                    <a:p>
+                      <a:pPr algn="dist"/>
+                      <a:endParaRPr lang="zh-CN" altLang="en-US" b="1" dirty="0">
+                        <a:solidFill>
+                          <a:schemeClr val="bg1"/>
+                        </a:solidFill>
+                        <a:effectLst/>
+                        <a:latin typeface="Helvetica" pitchFamily="2" charset="0"/>
+                      </a:endParaRPr>
+                    </a:p>
+                  </a:txBody>
+                  <a:tcPr marL="38100" marR="38100" marT="38100" marB="38100" anchor="ctr">
+                    <a:lnL w="9525" cap="flat" cmpd="sng" algn="ctr">
+                      <a:solidFill>
+                        <a:srgbClr val="FFFFFF"/>
+                      </a:solidFill>
+                      <a:prstDash val="solid"/>
+                      <a:round/>
+                      <a:headEnd type="none" w="med" len="med"/>
+                      <a:tailEnd type="none" w="med" len="med"/>
+                    </a:lnL>
+                    <a:lnR w="9525" cap="flat" cmpd="sng" algn="ctr">
+                      <a:solidFill>
+                        <a:srgbClr val="FFFFFF"/>
+                      </a:solidFill>
+                      <a:prstDash val="solid"/>
+                      <a:round/>
+                      <a:headEnd type="none" w="med" len="med"/>
+                      <a:tailEnd type="none" w="med" len="med"/>
+                    </a:lnR>
+                    <a:lnT w="9525" cap="flat" cmpd="sng" algn="ctr">
+                      <a:solidFill>
+                        <a:srgbClr val="FFFFFF"/>
+                      </a:solidFill>
+                      <a:prstDash val="solid"/>
+                      <a:round/>
+                      <a:headEnd type="none" w="med" len="med"/>
+                      <a:tailEnd type="none" w="med" len="med"/>
+                    </a:lnT>
+                    <a:lnB w="9525" cap="flat" cmpd="sng" algn="ctr">
+                      <a:solidFill>
+                        <a:srgbClr val="FFFFFF"/>
+                      </a:solidFill>
+                      <a:prstDash val="solid"/>
+                      <a:round/>
+                      <a:headEnd type="none" w="med" len="med"/>
+                      <a:tailEnd type="none" w="med" len="med"/>
+                    </a:lnB>
+                    <a:solidFill>
+                      <a:srgbClr val="00568A">
+                        <a:alpha val="63781"/>
+                      </a:srgbClr>
+                    </a:solidFill>
+                  </a:tcPr>
+                </a:tc>
+                <a:tc>
+                  <a:txBody>
+                    <a:bodyPr/>
+                    <a:lstStyle/>
+                    <a:p>
+                      <a:pPr algn="dist"/>
+                      <a:endParaRPr lang="zh-CN" altLang="en-US" b="1" dirty="0">
+                        <a:solidFill>
+                          <a:schemeClr val="bg1"/>
+                        </a:solidFill>
+                        <a:effectLst/>
+                        <a:latin typeface="Helvetica" pitchFamily="2" charset="0"/>
+                      </a:endParaRPr>
+                    </a:p>
+                  </a:txBody>
+                  <a:tcPr marL="38100" marR="38100" marT="38100" marB="38100" anchor="ctr">
+                    <a:lnL w="9525" cap="flat" cmpd="sng" algn="ctr">
+                      <a:solidFill>
+                        <a:srgbClr val="FFFFFF"/>
+                      </a:solidFill>
+                      <a:prstDash val="solid"/>
+                      <a:round/>
+                      <a:headEnd type="none" w="med" len="med"/>
+                      <a:tailEnd type="none" w="med" len="med"/>
+                    </a:lnL>
+                    <a:lnR w="9525" cap="flat" cmpd="sng" algn="ctr">
+                      <a:solidFill>
+                        <a:srgbClr val="FFFFFF"/>
+                      </a:solidFill>
+                      <a:prstDash val="solid"/>
+                      <a:round/>
+                      <a:headEnd type="none" w="med" len="med"/>
+                      <a:tailEnd type="none" w="med" len="med"/>
+                    </a:lnR>
+                    <a:lnT w="9525" cap="flat" cmpd="sng" algn="ctr">
+                      <a:solidFill>
+                        <a:srgbClr val="FFFFFF"/>
+                      </a:solidFill>
+                      <a:prstDash val="solid"/>
+                      <a:round/>
+                      <a:headEnd type="none" w="med" len="med"/>
+                      <a:tailEnd type="none" w="med" len="med"/>
+                    </a:lnT>
+                    <a:lnB w="9525" cap="flat" cmpd="sng" algn="ctr">
+                      <a:solidFill>
+                        <a:srgbClr val="FFFFFF"/>
+                      </a:solidFill>
+                      <a:prstDash val="solid"/>
+                      <a:round/>
+                      <a:headEnd type="none" w="med" len="med"/>
+                      <a:tailEnd type="none" w="med" len="med"/>
+                    </a:lnB>
+                    <a:solidFill>
+                      <a:srgbClr val="00568A">
+                        <a:alpha val="63781"/>
+                      </a:srgbClr>
+                    </a:solidFill>
+                  </a:tcPr>
+                </a:tc>
+                <a:extLst>
+                  <a:ext uri="{0D108BD9-81ED-4DB2-BD59-A6C34878D82A}">
+                    <a16:rowId xmlns:a16="http://schemas.microsoft.com/office/drawing/2014/main" val="1616598419"/>
+                  </a:ext>
+                </a:extLst>
+              </a:tr>
+            </a:tbl>
+          </a:graphicData>
+        </a:graphic>
+      </p:graphicFrame>
+      <p:sp>
+        <p:nvSpPr>
+          <p:cNvPr id="5" name="文本框 4">
+            <a:extLst>
+              <a:ext uri="{FF2B5EF4-FFF2-40B4-BE49-F238E27FC236}">
+                <a16:creationId xmlns:a16="http://schemas.microsoft.com/office/drawing/2014/main" id="{30E8B4FE-6298-A846-BC2B-5E0C1AD53A92}"/>
+              </a:ext>
+            </a:extLst>
+          </p:cNvPr>
+          <p:cNvSpPr txBox="1"/>
+          <p:nvPr/>
+        </p:nvSpPr>
+        <p:spPr>
+          <a:xfrm>
+            <a:off x="1353440" y="3697541"/>
+            <a:ext cx="1330037" cy="646331"/>
+          </a:xfrm>
+          <a:prstGeom prst="rect">
+            <a:avLst/>
+          </a:prstGeom>
+          <a:noFill/>
+        </p:spPr>
+        <p:txBody>
+          <a:bodyPr wrap="square" rtlCol="0">
+            <a:spAutoFit/>
+          </a:bodyPr>
+          <a:lstStyle/>
+          <a:p>
+            <a:r>
+              <a:rPr kumimoji="1" lang="zh-CN" altLang="en-US" dirty="0"/>
+              <a:t>输入图像</a:t>
+            </a:r>
+            <a:r>
+              <a:rPr kumimoji="1" lang="en-US" altLang="zh-CN" dirty="0"/>
+              <a:t>(5X5)</a:t>
+            </a:r>
+            <a:endParaRPr kumimoji="1" lang="zh-CN" altLang="en-US" dirty="0"/>
+          </a:p>
+        </p:txBody>
+      </p:sp>
+      <p:sp>
+        <p:nvSpPr>
+          <p:cNvPr id="6" name="文本框 5">
+            <a:extLst>
+              <a:ext uri="{FF2B5EF4-FFF2-40B4-BE49-F238E27FC236}">
+                <a16:creationId xmlns:a16="http://schemas.microsoft.com/office/drawing/2014/main" id="{1AE0133C-09D8-964F-BB27-07A279582811}"/>
+              </a:ext>
+            </a:extLst>
+          </p:cNvPr>
+          <p:cNvSpPr txBox="1"/>
+          <p:nvPr/>
+        </p:nvSpPr>
+        <p:spPr>
+          <a:xfrm>
+            <a:off x="4767309" y="3191291"/>
+            <a:ext cx="2059562" cy="646331"/>
+          </a:xfrm>
+          <a:prstGeom prst="rect">
+            <a:avLst/>
+          </a:prstGeom>
+          <a:noFill/>
+        </p:spPr>
+        <p:txBody>
+          <a:bodyPr wrap="square" rtlCol="0">
+            <a:spAutoFit/>
+          </a:bodyPr>
+          <a:lstStyle/>
+          <a:p>
+            <a:r>
+              <a:rPr kumimoji="1" lang="zh-CN" altLang="en-US" dirty="0"/>
+              <a:t>池化核</a:t>
+            </a:r>
+            <a:r>
+              <a:rPr kumimoji="1" lang="en-US" altLang="zh-CN" dirty="0"/>
+              <a:t>(3x3), </a:t>
+            </a:r>
+            <a:r>
+              <a:rPr kumimoji="1" lang="en-US" altLang="zh-CN" dirty="0" err="1"/>
+              <a:t>kernel_size</a:t>
+            </a:r>
+            <a:r>
+              <a:rPr kumimoji="1" lang="en-US" altLang="zh-CN" dirty="0"/>
+              <a:t>=3</a:t>
+            </a:r>
+            <a:endParaRPr kumimoji="1" lang="zh-CN" altLang="en-US" dirty="0"/>
+          </a:p>
+        </p:txBody>
+      </p:sp>
+      <p:sp>
+        <p:nvSpPr>
+          <p:cNvPr id="3" name="文本框 2">
+            <a:extLst>
+              <a:ext uri="{FF2B5EF4-FFF2-40B4-BE49-F238E27FC236}">
+                <a16:creationId xmlns:a16="http://schemas.microsoft.com/office/drawing/2014/main" id="{594908C8-BBE9-DF4A-BC51-EA6F94CB79B7}"/>
+              </a:ext>
+            </a:extLst>
+          </p:cNvPr>
+          <p:cNvSpPr txBox="1"/>
+          <p:nvPr/>
+        </p:nvSpPr>
+        <p:spPr>
+          <a:xfrm>
+            <a:off x="4767309" y="213064"/>
+            <a:ext cx="3157491" cy="369332"/>
+          </a:xfrm>
+          <a:prstGeom prst="rect">
+            <a:avLst/>
+          </a:prstGeom>
+          <a:noFill/>
+        </p:spPr>
+        <p:txBody>
+          <a:bodyPr wrap="square" rtlCol="0">
+            <a:spAutoFit/>
+          </a:bodyPr>
+          <a:lstStyle/>
+          <a:p>
+            <a:r>
+              <a:rPr kumimoji="1" lang="zh-CN" altLang="en-US" dirty="0"/>
+              <a:t>最大池化操作</a:t>
+            </a:r>
+          </a:p>
+        </p:txBody>
+      </p:sp>
+      <p:graphicFrame>
+        <p:nvGraphicFramePr>
+          <p:cNvPr id="14" name="表格 14">
+            <a:extLst>
+              <a:ext uri="{FF2B5EF4-FFF2-40B4-BE49-F238E27FC236}">
+                <a16:creationId xmlns:a16="http://schemas.microsoft.com/office/drawing/2014/main" id="{1C21D8A5-C72D-5349-B006-5A4222C29C3E}"/>
+              </a:ext>
+            </a:extLst>
+          </p:cNvPr>
+          <p:cNvGraphicFramePr>
+            <a:graphicFrameLocks noGrp="1"/>
+          </p:cNvGraphicFramePr>
+          <p:nvPr>
+            <p:extLst>
+              <p:ext uri="{D42A27DB-BD31-4B8C-83A1-F6EECF244321}">
+                <p14:modId xmlns:p14="http://schemas.microsoft.com/office/powerpoint/2010/main" val="86639978"/>
+              </p:ext>
+            </p:extLst>
+          </p:nvPr>
+        </p:nvGraphicFramePr>
+        <p:xfrm>
+          <a:off x="9214034" y="1026142"/>
+          <a:ext cx="746712" cy="741680"/>
+        </p:xfrm>
+        <a:graphic>
+          <a:graphicData uri="http://schemas.openxmlformats.org/drawingml/2006/table">
+            <a:tbl>
+              <a:tblPr firstRow="1" bandRow="1">
+                <a:tableStyleId>{5C22544A-7EE6-4342-B048-85BDC9FD1C3A}</a:tableStyleId>
+              </a:tblPr>
+              <a:tblGrid>
+                <a:gridCol w="373356">
+                  <a:extLst>
+                    <a:ext uri="{9D8B030D-6E8A-4147-A177-3AD203B41FA5}">
+                      <a16:colId xmlns:a16="http://schemas.microsoft.com/office/drawing/2014/main" val="664843416"/>
+                    </a:ext>
+                  </a:extLst>
+                </a:gridCol>
+                <a:gridCol w="373356">
+                  <a:extLst>
+                    <a:ext uri="{9D8B030D-6E8A-4147-A177-3AD203B41FA5}">
+                      <a16:colId xmlns:a16="http://schemas.microsoft.com/office/drawing/2014/main" val="2889235340"/>
+                    </a:ext>
+                  </a:extLst>
+                </a:gridCol>
+              </a:tblGrid>
+              <a:tr h="370840">
+                <a:tc>
+                  <a:txBody>
+                    <a:bodyPr/>
+                    <a:lstStyle/>
+                    <a:p>
+                      <a:r>
+                        <a:rPr lang="en-US" altLang="zh-CN" dirty="0"/>
+                        <a:t>2</a:t>
+                      </a:r>
+                      <a:endParaRPr lang="zh-CN" altLang="en-US" dirty="0"/>
+                    </a:p>
+                  </a:txBody>
+                  <a:tcPr/>
+                </a:tc>
+                <a:tc>
+                  <a:txBody>
+                    <a:bodyPr/>
+                    <a:lstStyle/>
+                    <a:p>
+                      <a:r>
+                        <a:rPr lang="en-US" altLang="zh-CN" dirty="0"/>
+                        <a:t>3</a:t>
+                      </a:r>
+                      <a:endParaRPr lang="zh-CN" altLang="en-US" dirty="0"/>
+                    </a:p>
+                  </a:txBody>
+                  <a:tcPr/>
+                </a:tc>
+                <a:extLst>
+                  <a:ext uri="{0D108BD9-81ED-4DB2-BD59-A6C34878D82A}">
+                    <a16:rowId xmlns:a16="http://schemas.microsoft.com/office/drawing/2014/main" val="4065274786"/>
+                  </a:ext>
+                </a:extLst>
+              </a:tr>
+              <a:tr h="370840">
+                <a:tc>
+                  <a:txBody>
+                    <a:bodyPr/>
+                    <a:lstStyle/>
+                    <a:p>
+                      <a:r>
+                        <a:rPr lang="en-US" altLang="zh-CN" dirty="0"/>
+                        <a:t>5</a:t>
+                      </a:r>
+                      <a:endParaRPr lang="zh-CN" altLang="en-US" dirty="0"/>
+                    </a:p>
+                  </a:txBody>
+                  <a:tcPr/>
+                </a:tc>
+                <a:tc>
+                  <a:txBody>
+                    <a:bodyPr/>
+                    <a:lstStyle/>
+                    <a:p>
+                      <a:r>
+                        <a:rPr lang="en-US" altLang="zh-CN" dirty="0"/>
+                        <a:t>1</a:t>
+                      </a:r>
+                      <a:endParaRPr lang="zh-CN" altLang="en-US" dirty="0"/>
+                    </a:p>
+                  </a:txBody>
+                  <a:tcPr/>
+                </a:tc>
+                <a:extLst>
+                  <a:ext uri="{0D108BD9-81ED-4DB2-BD59-A6C34878D82A}">
+                    <a16:rowId xmlns:a16="http://schemas.microsoft.com/office/drawing/2014/main" val="101206423"/>
+                  </a:ext>
+                </a:extLst>
+              </a:tr>
+            </a:tbl>
+          </a:graphicData>
+        </a:graphic>
+      </p:graphicFrame>
+      <p:sp>
+        <p:nvSpPr>
+          <p:cNvPr id="15" name="文本框 14">
+            <a:extLst>
+              <a:ext uri="{FF2B5EF4-FFF2-40B4-BE49-F238E27FC236}">
+                <a16:creationId xmlns:a16="http://schemas.microsoft.com/office/drawing/2014/main" id="{0BB7AEE3-4343-F74D-9B40-0AD35A016B61}"/>
+              </a:ext>
+            </a:extLst>
+          </p:cNvPr>
+          <p:cNvSpPr txBox="1"/>
+          <p:nvPr/>
+        </p:nvSpPr>
+        <p:spPr>
+          <a:xfrm>
+            <a:off x="7563775" y="1127464"/>
+            <a:ext cx="1313895" cy="646331"/>
+          </a:xfrm>
+          <a:prstGeom prst="rect">
+            <a:avLst/>
+          </a:prstGeom>
+          <a:noFill/>
+        </p:spPr>
+        <p:txBody>
+          <a:bodyPr wrap="square" rtlCol="0">
+            <a:spAutoFit/>
+          </a:bodyPr>
+          <a:lstStyle/>
+          <a:p>
+            <a:r>
+              <a:rPr kumimoji="1" lang="en-US" altLang="zh-CN" dirty="0" err="1"/>
+              <a:t>Ceil_model</a:t>
+            </a:r>
+            <a:r>
+              <a:rPr kumimoji="1" lang="en-US" altLang="zh-CN" dirty="0"/>
+              <a:t>=True</a:t>
+            </a:r>
+            <a:endParaRPr kumimoji="1" lang="zh-CN" altLang="en-US" dirty="0"/>
+          </a:p>
+        </p:txBody>
+      </p:sp>
+      <p:sp>
+        <p:nvSpPr>
+          <p:cNvPr id="16" name="文本框 15">
+            <a:extLst>
+              <a:ext uri="{FF2B5EF4-FFF2-40B4-BE49-F238E27FC236}">
+                <a16:creationId xmlns:a16="http://schemas.microsoft.com/office/drawing/2014/main" id="{94386474-EDBE-6B43-A5B0-84672E823021}"/>
+              </a:ext>
+            </a:extLst>
+          </p:cNvPr>
+          <p:cNvSpPr txBox="1"/>
+          <p:nvPr/>
+        </p:nvSpPr>
+        <p:spPr>
+          <a:xfrm>
+            <a:off x="7563775" y="3160459"/>
+            <a:ext cx="1313895" cy="646331"/>
+          </a:xfrm>
+          <a:prstGeom prst="rect">
+            <a:avLst/>
+          </a:prstGeom>
+          <a:noFill/>
+        </p:spPr>
+        <p:txBody>
+          <a:bodyPr wrap="square" rtlCol="0">
+            <a:spAutoFit/>
+          </a:bodyPr>
+          <a:lstStyle/>
+          <a:p>
+            <a:r>
+              <a:rPr kumimoji="1" lang="en-US" altLang="zh-CN" dirty="0" err="1"/>
+              <a:t>Ceil_model</a:t>
+            </a:r>
+            <a:r>
+              <a:rPr kumimoji="1" lang="en-US" altLang="zh-CN" dirty="0"/>
+              <a:t>=False</a:t>
+            </a:r>
+            <a:endParaRPr kumimoji="1" lang="zh-CN" altLang="en-US" dirty="0"/>
+          </a:p>
+        </p:txBody>
+      </p:sp>
+      <p:graphicFrame>
+        <p:nvGraphicFramePr>
+          <p:cNvPr id="17" name="表格 14">
+            <a:extLst>
+              <a:ext uri="{FF2B5EF4-FFF2-40B4-BE49-F238E27FC236}">
+                <a16:creationId xmlns:a16="http://schemas.microsoft.com/office/drawing/2014/main" id="{D2DAE400-8A49-9242-9828-E1CE57DDC6F1}"/>
+              </a:ext>
+            </a:extLst>
+          </p:cNvPr>
+          <p:cNvGraphicFramePr>
+            <a:graphicFrameLocks noGrp="1"/>
+          </p:cNvGraphicFramePr>
+          <p:nvPr>
+            <p:extLst>
+              <p:ext uri="{D42A27DB-BD31-4B8C-83A1-F6EECF244321}">
+                <p14:modId xmlns:p14="http://schemas.microsoft.com/office/powerpoint/2010/main" val="2703246605"/>
+              </p:ext>
+            </p:extLst>
+          </p:nvPr>
+        </p:nvGraphicFramePr>
+        <p:xfrm>
+          <a:off x="9214034" y="3191291"/>
+          <a:ext cx="453748" cy="370840"/>
+        </p:xfrm>
+        <a:graphic>
+          <a:graphicData uri="http://schemas.openxmlformats.org/drawingml/2006/table">
+            <a:tbl>
+              <a:tblPr firstRow="1" bandRow="1">
+                <a:tableStyleId>{5C22544A-7EE6-4342-B048-85BDC9FD1C3A}</a:tableStyleId>
+              </a:tblPr>
+              <a:tblGrid>
+                <a:gridCol w="453748">
+                  <a:extLst>
+                    <a:ext uri="{9D8B030D-6E8A-4147-A177-3AD203B41FA5}">
+                      <a16:colId xmlns:a16="http://schemas.microsoft.com/office/drawing/2014/main" val="664843416"/>
+                    </a:ext>
+                  </a:extLst>
+                </a:gridCol>
+              </a:tblGrid>
+              <a:tr h="370840">
+                <a:tc>
+                  <a:txBody>
+                    <a:bodyPr/>
+                    <a:lstStyle/>
+                    <a:p>
+                      <a:r>
+                        <a:rPr lang="en-US" altLang="zh-CN" dirty="0"/>
+                        <a:t>2</a:t>
+                      </a:r>
+                      <a:endParaRPr lang="zh-CN" altLang="en-US" dirty="0"/>
+                    </a:p>
+                  </a:txBody>
+                  <a:tcPr/>
+                </a:tc>
+                <a:extLst>
+                  <a:ext uri="{0D108BD9-81ED-4DB2-BD59-A6C34878D82A}">
+                    <a16:rowId xmlns:a16="http://schemas.microsoft.com/office/drawing/2014/main" val="4065274786"/>
+                  </a:ext>
+                </a:extLst>
+              </a:tr>
+            </a:tbl>
+          </a:graphicData>
+        </a:graphic>
+      </p:graphicFrame>
+    </p:spTree>
+    <p:extLst>
+      <p:ext uri="{BB962C8B-B14F-4D97-AF65-F5344CB8AC3E}">
+        <p14:creationId xmlns:p14="http://schemas.microsoft.com/office/powerpoint/2010/main" val="660359613"/>
       </p:ext>
     </p:extLst>
   </p:cSld>

</xml_diff>

<commit_message>
fix bug in test.py
</commit_message>
<xml_diff>
--- a/notes/演示.pptx
+++ b/notes/演示.pptx
@@ -5,7 +5,7 @@
     <p:sldMasterId id="2147483648" r:id="rId1"/>
   </p:sldMasterIdLst>
   <p:notesMasterIdLst>
-    <p:notesMasterId r:id="rId19"/>
+    <p:notesMasterId r:id="rId20"/>
   </p:notesMasterIdLst>
   <p:sldIdLst>
     <p:sldId id="256" r:id="rId2"/>
@@ -25,6 +25,7 @@
     <p:sldId id="270" r:id="rId16"/>
     <p:sldId id="271" r:id="rId17"/>
     <p:sldId id="272" r:id="rId18"/>
+    <p:sldId id="273" r:id="rId19"/>
   </p:sldIdLst>
   <p:sldSz cx="12192000" cy="6858000"/>
   <p:notesSz cx="6858000" cy="9144000"/>
@@ -213,7 +214,7 @@
           <a:p>
             <a:fld id="{4E4BEC4E-2CA9-7B4A-960D-5AD8761FD9EA}" type="datetimeFigureOut">
               <a:rPr kumimoji="1" lang="zh-CN" altLang="en-US" smtClean="0"/>
-              <a:t>2021/5/30</a:t>
+              <a:t>2021/6/2</a:t>
             </a:fld>
             <a:endParaRPr kumimoji="1" lang="zh-CN" altLang="en-US"/>
           </a:p>
@@ -627,7 +628,7 @@
           <a:p>
             <a:fld id="{1B839DDA-FDEA-D74D-B0E8-579EAEAB0023}" type="datetimeFigureOut">
               <a:rPr kumimoji="1" lang="zh-CN" altLang="en-US" smtClean="0"/>
-              <a:t>2021/5/30</a:t>
+              <a:t>2021/6/2</a:t>
             </a:fld>
             <a:endParaRPr kumimoji="1" lang="zh-CN" altLang="en-US"/>
           </a:p>
@@ -825,7 +826,7 @@
           <a:p>
             <a:fld id="{1B839DDA-FDEA-D74D-B0E8-579EAEAB0023}" type="datetimeFigureOut">
               <a:rPr kumimoji="1" lang="zh-CN" altLang="en-US" smtClean="0"/>
-              <a:t>2021/5/30</a:t>
+              <a:t>2021/6/2</a:t>
             </a:fld>
             <a:endParaRPr kumimoji="1" lang="zh-CN" altLang="en-US"/>
           </a:p>
@@ -1033,7 +1034,7 @@
           <a:p>
             <a:fld id="{1B839DDA-FDEA-D74D-B0E8-579EAEAB0023}" type="datetimeFigureOut">
               <a:rPr kumimoji="1" lang="zh-CN" altLang="en-US" smtClean="0"/>
-              <a:t>2021/5/30</a:t>
+              <a:t>2021/6/2</a:t>
             </a:fld>
             <a:endParaRPr kumimoji="1" lang="zh-CN" altLang="en-US"/>
           </a:p>
@@ -1231,7 +1232,7 @@
           <a:p>
             <a:fld id="{1B839DDA-FDEA-D74D-B0E8-579EAEAB0023}" type="datetimeFigureOut">
               <a:rPr kumimoji="1" lang="zh-CN" altLang="en-US" smtClean="0"/>
-              <a:t>2021/5/30</a:t>
+              <a:t>2021/6/2</a:t>
             </a:fld>
             <a:endParaRPr kumimoji="1" lang="zh-CN" altLang="en-US"/>
           </a:p>
@@ -1506,7 +1507,7 @@
           <a:p>
             <a:fld id="{1B839DDA-FDEA-D74D-B0E8-579EAEAB0023}" type="datetimeFigureOut">
               <a:rPr kumimoji="1" lang="zh-CN" altLang="en-US" smtClean="0"/>
-              <a:t>2021/5/30</a:t>
+              <a:t>2021/6/2</a:t>
             </a:fld>
             <a:endParaRPr kumimoji="1" lang="zh-CN" altLang="en-US"/>
           </a:p>
@@ -1771,7 +1772,7 @@
           <a:p>
             <a:fld id="{1B839DDA-FDEA-D74D-B0E8-579EAEAB0023}" type="datetimeFigureOut">
               <a:rPr kumimoji="1" lang="zh-CN" altLang="en-US" smtClean="0"/>
-              <a:t>2021/5/30</a:t>
+              <a:t>2021/6/2</a:t>
             </a:fld>
             <a:endParaRPr kumimoji="1" lang="zh-CN" altLang="en-US"/>
           </a:p>
@@ -2183,7 +2184,7 @@
           <a:p>
             <a:fld id="{1B839DDA-FDEA-D74D-B0E8-579EAEAB0023}" type="datetimeFigureOut">
               <a:rPr kumimoji="1" lang="zh-CN" altLang="en-US" smtClean="0"/>
-              <a:t>2021/5/30</a:t>
+              <a:t>2021/6/2</a:t>
             </a:fld>
             <a:endParaRPr kumimoji="1" lang="zh-CN" altLang="en-US"/>
           </a:p>
@@ -2324,7 +2325,7 @@
           <a:p>
             <a:fld id="{1B839DDA-FDEA-D74D-B0E8-579EAEAB0023}" type="datetimeFigureOut">
               <a:rPr kumimoji="1" lang="zh-CN" altLang="en-US" smtClean="0"/>
-              <a:t>2021/5/30</a:t>
+              <a:t>2021/6/2</a:t>
             </a:fld>
             <a:endParaRPr kumimoji="1" lang="zh-CN" altLang="en-US"/>
           </a:p>
@@ -2437,7 +2438,7 @@
           <a:p>
             <a:fld id="{1B839DDA-FDEA-D74D-B0E8-579EAEAB0023}" type="datetimeFigureOut">
               <a:rPr kumimoji="1" lang="zh-CN" altLang="en-US" smtClean="0"/>
-              <a:t>2021/5/30</a:t>
+              <a:t>2021/6/2</a:t>
             </a:fld>
             <a:endParaRPr kumimoji="1" lang="zh-CN" altLang="en-US"/>
           </a:p>
@@ -2748,7 +2749,7 @@
           <a:p>
             <a:fld id="{1B839DDA-FDEA-D74D-B0E8-579EAEAB0023}" type="datetimeFigureOut">
               <a:rPr kumimoji="1" lang="zh-CN" altLang="en-US" smtClean="0"/>
-              <a:t>2021/5/30</a:t>
+              <a:t>2021/6/2</a:t>
             </a:fld>
             <a:endParaRPr kumimoji="1" lang="zh-CN" altLang="en-US"/>
           </a:p>
@@ -3036,7 +3037,7 @@
           <a:p>
             <a:fld id="{1B839DDA-FDEA-D74D-B0E8-579EAEAB0023}" type="datetimeFigureOut">
               <a:rPr kumimoji="1" lang="zh-CN" altLang="en-US" smtClean="0"/>
-              <a:t>2021/5/30</a:t>
+              <a:t>2021/6/2</a:t>
             </a:fld>
             <a:endParaRPr kumimoji="1" lang="zh-CN" altLang="en-US"/>
           </a:p>
@@ -3277,7 +3278,7 @@
           <a:p>
             <a:fld id="{1B839DDA-FDEA-D74D-B0E8-579EAEAB0023}" type="datetimeFigureOut">
               <a:rPr kumimoji="1" lang="zh-CN" altLang="en-US" smtClean="0"/>
-              <a:t>2021/5/30</a:t>
+              <a:t>2021/6/2</a:t>
             </a:fld>
             <a:endParaRPr kumimoji="1" lang="zh-CN" altLang="en-US"/>
           </a:p>
@@ -5607,6 +5608,176 @@
     <p:extLst>
       <p:ext uri="{BB962C8B-B14F-4D97-AF65-F5344CB8AC3E}">
         <p14:creationId xmlns:p14="http://schemas.microsoft.com/office/powerpoint/2010/main" val="3495814872"/>
+      </p:ext>
+    </p:extLst>
+  </p:cSld>
+  <p:clrMapOvr>
+    <a:masterClrMapping/>
+  </p:clrMapOvr>
+</p:sld>
+</file>
+
+<file path=ppt/slides/slide18.xml><?xml version="1.0" encoding="utf-8"?>
+<p:sld xmlns:a="http://schemas.openxmlformats.org/drawingml/2006/main" xmlns:r="http://schemas.openxmlformats.org/officeDocument/2006/relationships" xmlns:p="http://schemas.openxmlformats.org/presentationml/2006/main">
+  <p:cSld>
+    <p:spTree>
+      <p:nvGrpSpPr>
+        <p:cNvPr id="1" name=""/>
+        <p:cNvGrpSpPr/>
+        <p:nvPr/>
+      </p:nvGrpSpPr>
+      <p:grpSpPr>
+        <a:xfrm>
+          <a:off x="0" y="0"/>
+          <a:ext cx="0" cy="0"/>
+          <a:chOff x="0" y="0"/>
+          <a:chExt cx="0" cy="0"/>
+        </a:xfrm>
+      </p:grpSpPr>
+      <p:pic>
+        <p:nvPicPr>
+          <p:cNvPr id="2" name="图片 1">
+            <a:extLst>
+              <a:ext uri="{FF2B5EF4-FFF2-40B4-BE49-F238E27FC236}">
+                <a16:creationId xmlns:a16="http://schemas.microsoft.com/office/drawing/2014/main" id="{A8AC2D54-29B4-C14B-B430-F844CFAA4065}"/>
+              </a:ext>
+            </a:extLst>
+          </p:cNvPr>
+          <p:cNvPicPr>
+            <a:picLocks noChangeAspect="1"/>
+          </p:cNvPicPr>
+          <p:nvPr/>
+        </p:nvPicPr>
+        <p:blipFill>
+          <a:blip r:embed="rId2"/>
+          <a:stretch>
+            <a:fillRect/>
+          </a:stretch>
+        </p:blipFill>
+        <p:spPr>
+          <a:xfrm>
+            <a:off x="2173981" y="1193738"/>
+            <a:ext cx="2730500" cy="2730500"/>
+          </a:xfrm>
+          <a:prstGeom prst="rect">
+            <a:avLst/>
+          </a:prstGeom>
+        </p:spPr>
+      </p:pic>
+      <p:pic>
+        <p:nvPicPr>
+          <p:cNvPr id="3" name="图片 2">
+            <a:extLst>
+              <a:ext uri="{FF2B5EF4-FFF2-40B4-BE49-F238E27FC236}">
+                <a16:creationId xmlns:a16="http://schemas.microsoft.com/office/drawing/2014/main" id="{F2A0D782-24AC-0949-934B-4F2EC20A567A}"/>
+              </a:ext>
+            </a:extLst>
+          </p:cNvPr>
+          <p:cNvPicPr>
+            <a:picLocks noChangeAspect="1"/>
+          </p:cNvPicPr>
+          <p:nvPr/>
+        </p:nvPicPr>
+        <p:blipFill>
+          <a:blip r:embed="rId3"/>
+          <a:stretch>
+            <a:fillRect/>
+          </a:stretch>
+        </p:blipFill>
+        <p:spPr>
+          <a:xfrm>
+            <a:off x="6018453" y="663643"/>
+            <a:ext cx="4254500" cy="4927600"/>
+          </a:xfrm>
+          <a:prstGeom prst="rect">
+            <a:avLst/>
+          </a:prstGeom>
+        </p:spPr>
+      </p:pic>
+      <p:sp>
+        <p:nvSpPr>
+          <p:cNvPr id="4" name="文本框 3">
+            <a:extLst>
+              <a:ext uri="{FF2B5EF4-FFF2-40B4-BE49-F238E27FC236}">
+                <a16:creationId xmlns:a16="http://schemas.microsoft.com/office/drawing/2014/main" id="{004E89F3-ECF0-3D4A-AE88-D96803AE06BF}"/>
+              </a:ext>
+            </a:extLst>
+          </p:cNvPr>
+          <p:cNvSpPr txBox="1"/>
+          <p:nvPr/>
+        </p:nvSpPr>
+        <p:spPr>
+          <a:xfrm>
+            <a:off x="2840855" y="4332303"/>
+            <a:ext cx="1713390" cy="369332"/>
+          </a:xfrm>
+          <a:prstGeom prst="rect">
+            <a:avLst/>
+          </a:prstGeom>
+          <a:noFill/>
+        </p:spPr>
+        <p:txBody>
+          <a:bodyPr wrap="square" rtlCol="0">
+            <a:spAutoFit/>
+          </a:bodyPr>
+          <a:lstStyle/>
+          <a:p>
+            <a:r>
+              <a:rPr kumimoji="1" lang="zh-CN" altLang="en-US" dirty="0"/>
+              <a:t>个人微信号</a:t>
+            </a:r>
+          </a:p>
+        </p:txBody>
+      </p:sp>
+      <p:sp>
+        <p:nvSpPr>
+          <p:cNvPr id="5" name="文本框 4">
+            <a:extLst>
+              <a:ext uri="{FF2B5EF4-FFF2-40B4-BE49-F238E27FC236}">
+                <a16:creationId xmlns:a16="http://schemas.microsoft.com/office/drawing/2014/main" id="{21987A43-5C3B-3846-B5DC-DEB8E21BA68A}"/>
+              </a:ext>
+            </a:extLst>
+          </p:cNvPr>
+          <p:cNvSpPr txBox="1"/>
+          <p:nvPr/>
+        </p:nvSpPr>
+        <p:spPr>
+          <a:xfrm>
+            <a:off x="7156882" y="5271027"/>
+            <a:ext cx="2466512" cy="923330"/>
+          </a:xfrm>
+          <a:prstGeom prst="rect">
+            <a:avLst/>
+          </a:prstGeom>
+          <a:noFill/>
+        </p:spPr>
+        <p:txBody>
+          <a:bodyPr wrap="square" rtlCol="0">
+            <a:spAutoFit/>
+          </a:bodyPr>
+          <a:lstStyle/>
+          <a:p>
+            <a:r>
+              <a:rPr kumimoji="1" lang="zh-CN" altLang="en-US" dirty="0"/>
+              <a:t>           公众号</a:t>
+            </a:r>
+            <a:endParaRPr kumimoji="1" lang="en-US" altLang="zh-CN" dirty="0"/>
+          </a:p>
+          <a:p>
+            <a:endParaRPr kumimoji="1" lang="en-US" altLang="zh-CN" dirty="0"/>
+          </a:p>
+          <a:p>
+            <a:r>
+              <a:rPr kumimoji="1" lang="zh-CN" altLang="en-US" dirty="0"/>
+              <a:t>对不起，不聊技术</a:t>
+            </a:r>
+          </a:p>
+        </p:txBody>
+      </p:sp>
+    </p:spTree>
+    <p:extLst>
+      <p:ext uri="{BB962C8B-B14F-4D97-AF65-F5344CB8AC3E}">
+        <p14:creationId xmlns:p14="http://schemas.microsoft.com/office/powerpoint/2010/main" val="2059876913"/>
       </p:ext>
     </p:extLst>
   </p:cSld>

</xml_diff>